<commit_message>
Presentation is now finished
</commit_message>
<xml_diff>
--- a/presentation/smargn-presentation.pptx
+++ b/presentation/smargn-presentation.pptx
@@ -4,13 +4,25 @@
   <p:sldMasterIdLst>
     <p:sldMasterId id="2147483672" r:id="rId1"/>
   </p:sldMasterIdLst>
+  <p:notesMasterIdLst>
+    <p:notesMasterId r:id="rId17"/>
+  </p:notesMasterIdLst>
   <p:sldIdLst>
     <p:sldId id="256" r:id="rId2"/>
     <p:sldId id="257" r:id="rId3"/>
-    <p:sldId id="258" r:id="rId4"/>
-    <p:sldId id="259" r:id="rId5"/>
-    <p:sldId id="260" r:id="rId6"/>
-    <p:sldId id="261" r:id="rId7"/>
+    <p:sldId id="266" r:id="rId4"/>
+    <p:sldId id="260" r:id="rId5"/>
+    <p:sldId id="258" r:id="rId6"/>
+    <p:sldId id="259" r:id="rId7"/>
+    <p:sldId id="270" r:id="rId8"/>
+    <p:sldId id="261" r:id="rId9"/>
+    <p:sldId id="262" r:id="rId10"/>
+    <p:sldId id="263" r:id="rId11"/>
+    <p:sldId id="264" r:id="rId12"/>
+    <p:sldId id="265" r:id="rId13"/>
+    <p:sldId id="269" r:id="rId14"/>
+    <p:sldId id="268" r:id="rId15"/>
+    <p:sldId id="271" r:id="rId16"/>
   </p:sldIdLst>
   <p:sldSz cx="9144000" cy="6858000" type="screen4x3"/>
   <p:notesSz cx="6858000" cy="9144000"/>
@@ -112,6 +124,356 @@
 </p:presentation>
 </file>
 
+<file path=ppt/notesMasters/notesMaster1.xml><?xml version="1.0" encoding="utf-8"?>
+<p:notesMaster xmlns:a="http://schemas.openxmlformats.org/drawingml/2006/main" xmlns:r="http://schemas.openxmlformats.org/officeDocument/2006/relationships" xmlns:p="http://schemas.openxmlformats.org/presentationml/2006/main">
+  <p:cSld>
+    <p:bg>
+      <p:bgRef idx="1001">
+        <a:schemeClr val="bg1"/>
+      </p:bgRef>
+    </p:bg>
+    <p:spTree>
+      <p:nvGrpSpPr>
+        <p:cNvPr id="1" name=""/>
+        <p:cNvGrpSpPr/>
+        <p:nvPr/>
+      </p:nvGrpSpPr>
+      <p:grpSpPr>
+        <a:xfrm>
+          <a:off x="0" y="0"/>
+          <a:ext cx="0" cy="0"/>
+          <a:chOff x="0" y="0"/>
+          <a:chExt cx="0" cy="0"/>
+        </a:xfrm>
+      </p:grpSpPr>
+      <p:sp>
+        <p:nvSpPr>
+          <p:cNvPr id="2" name="Espace réservé de l'en-tête 1"/>
+          <p:cNvSpPr>
+            <a:spLocks noGrp="1"/>
+          </p:cNvSpPr>
+          <p:nvPr>
+            <p:ph type="hdr" sz="quarter"/>
+          </p:nvPr>
+        </p:nvSpPr>
+        <p:spPr>
+          <a:xfrm>
+            <a:off x="0" y="0"/>
+            <a:ext cx="2971800" cy="457200"/>
+          </a:xfrm>
+          <a:prstGeom prst="rect">
+            <a:avLst/>
+          </a:prstGeom>
+        </p:spPr>
+        <p:txBody>
+          <a:bodyPr vert="horz" lIns="91440" tIns="45720" rIns="91440" bIns="45720" rtlCol="0"/>
+          <a:lstStyle>
+            <a:lvl1pPr algn="l">
+              <a:defRPr sz="1200"/>
+            </a:lvl1pPr>
+          </a:lstStyle>
+          <a:p>
+            <a:endParaRPr lang="en-US"/>
+          </a:p>
+        </p:txBody>
+      </p:sp>
+      <p:sp>
+        <p:nvSpPr>
+          <p:cNvPr id="3" name="Espace réservé de la date 2"/>
+          <p:cNvSpPr>
+            <a:spLocks noGrp="1"/>
+          </p:cNvSpPr>
+          <p:nvPr>
+            <p:ph type="dt" idx="1"/>
+          </p:nvPr>
+        </p:nvSpPr>
+        <p:spPr>
+          <a:xfrm>
+            <a:off x="3884613" y="0"/>
+            <a:ext cx="2971800" cy="457200"/>
+          </a:xfrm>
+          <a:prstGeom prst="rect">
+            <a:avLst/>
+          </a:prstGeom>
+        </p:spPr>
+        <p:txBody>
+          <a:bodyPr vert="horz" lIns="91440" tIns="45720" rIns="91440" bIns="45720" rtlCol="0"/>
+          <a:lstStyle>
+            <a:lvl1pPr algn="r">
+              <a:defRPr sz="1200"/>
+            </a:lvl1pPr>
+          </a:lstStyle>
+          <a:p>
+            <a:fld id="{A7FA7019-5B84-4F0C-8018-6DFD8E2EC8B6}" type="datetimeFigureOut">
+              <a:rPr lang="en-US" smtClean="0"/>
+              <a:t>5/17/2015</a:t>
+            </a:fld>
+            <a:endParaRPr lang="en-US"/>
+          </a:p>
+        </p:txBody>
+      </p:sp>
+      <p:sp>
+        <p:nvSpPr>
+          <p:cNvPr id="4" name="Espace réservé de l'image des diapositives 3"/>
+          <p:cNvSpPr>
+            <a:spLocks noGrp="1" noRot="1" noChangeAspect="1"/>
+          </p:cNvSpPr>
+          <p:nvPr>
+            <p:ph type="sldImg" idx="2"/>
+          </p:nvPr>
+        </p:nvSpPr>
+        <p:spPr>
+          <a:xfrm>
+            <a:off x="1143000" y="685800"/>
+            <a:ext cx="4572000" cy="3429000"/>
+          </a:xfrm>
+          <a:prstGeom prst="rect">
+            <a:avLst/>
+          </a:prstGeom>
+          <a:noFill/>
+          <a:ln w="12700">
+            <a:solidFill>
+              <a:prstClr val="black"/>
+            </a:solidFill>
+          </a:ln>
+        </p:spPr>
+        <p:txBody>
+          <a:bodyPr vert="horz" lIns="91440" tIns="45720" rIns="91440" bIns="45720" rtlCol="0" anchor="ctr"/>
+          <a:lstStyle/>
+          <a:p>
+            <a:endParaRPr lang="en-US"/>
+          </a:p>
+        </p:txBody>
+      </p:sp>
+      <p:sp>
+        <p:nvSpPr>
+          <p:cNvPr id="5" name="Espace réservé des commentaires 4"/>
+          <p:cNvSpPr>
+            <a:spLocks noGrp="1"/>
+          </p:cNvSpPr>
+          <p:nvPr>
+            <p:ph type="body" sz="quarter" idx="3"/>
+          </p:nvPr>
+        </p:nvSpPr>
+        <p:spPr>
+          <a:xfrm>
+            <a:off x="685800" y="4343400"/>
+            <a:ext cx="5486400" cy="4114800"/>
+          </a:xfrm>
+          <a:prstGeom prst="rect">
+            <a:avLst/>
+          </a:prstGeom>
+        </p:spPr>
+        <p:txBody>
+          <a:bodyPr vert="horz" lIns="91440" tIns="45720" rIns="91440" bIns="45720" rtlCol="0"/>
+          <a:lstStyle/>
+          <a:p>
+            <a:pPr lvl="0"/>
+            <a:r>
+              <a:rPr lang="fr-FR" smtClean="0"/>
+              <a:t>Modifiez les styles du texte du masque</a:t>
+            </a:r>
+          </a:p>
+          <a:p>
+            <a:pPr lvl="1"/>
+            <a:r>
+              <a:rPr lang="fr-FR" smtClean="0"/>
+              <a:t>Deuxième niveau</a:t>
+            </a:r>
+          </a:p>
+          <a:p>
+            <a:pPr lvl="2"/>
+            <a:r>
+              <a:rPr lang="fr-FR" smtClean="0"/>
+              <a:t>Troisième niveau</a:t>
+            </a:r>
+          </a:p>
+          <a:p>
+            <a:pPr lvl="3"/>
+            <a:r>
+              <a:rPr lang="fr-FR" smtClean="0"/>
+              <a:t>Quatrième niveau</a:t>
+            </a:r>
+          </a:p>
+          <a:p>
+            <a:pPr lvl="4"/>
+            <a:r>
+              <a:rPr lang="fr-FR" smtClean="0"/>
+              <a:t>Cinquième niveau</a:t>
+            </a:r>
+            <a:endParaRPr lang="en-US"/>
+          </a:p>
+        </p:txBody>
+      </p:sp>
+      <p:sp>
+        <p:nvSpPr>
+          <p:cNvPr id="6" name="Espace réservé du pied de page 5"/>
+          <p:cNvSpPr>
+            <a:spLocks noGrp="1"/>
+          </p:cNvSpPr>
+          <p:nvPr>
+            <p:ph type="ftr" sz="quarter" idx="4"/>
+          </p:nvPr>
+        </p:nvSpPr>
+        <p:spPr>
+          <a:xfrm>
+            <a:off x="0" y="8685213"/>
+            <a:ext cx="2971800" cy="457200"/>
+          </a:xfrm>
+          <a:prstGeom prst="rect">
+            <a:avLst/>
+          </a:prstGeom>
+        </p:spPr>
+        <p:txBody>
+          <a:bodyPr vert="horz" lIns="91440" tIns="45720" rIns="91440" bIns="45720" rtlCol="0" anchor="b"/>
+          <a:lstStyle>
+            <a:lvl1pPr algn="l">
+              <a:defRPr sz="1200"/>
+            </a:lvl1pPr>
+          </a:lstStyle>
+          <a:p>
+            <a:endParaRPr lang="en-US"/>
+          </a:p>
+        </p:txBody>
+      </p:sp>
+      <p:sp>
+        <p:nvSpPr>
+          <p:cNvPr id="7" name="Espace réservé du numéro de diapositive 6"/>
+          <p:cNvSpPr>
+            <a:spLocks noGrp="1"/>
+          </p:cNvSpPr>
+          <p:nvPr>
+            <p:ph type="sldNum" sz="quarter" idx="5"/>
+          </p:nvPr>
+        </p:nvSpPr>
+        <p:spPr>
+          <a:xfrm>
+            <a:off x="3884613" y="8685213"/>
+            <a:ext cx="2971800" cy="457200"/>
+          </a:xfrm>
+          <a:prstGeom prst="rect">
+            <a:avLst/>
+          </a:prstGeom>
+        </p:spPr>
+        <p:txBody>
+          <a:bodyPr vert="horz" lIns="91440" tIns="45720" rIns="91440" bIns="45720" rtlCol="0" anchor="b"/>
+          <a:lstStyle>
+            <a:lvl1pPr algn="r">
+              <a:defRPr sz="1200"/>
+            </a:lvl1pPr>
+          </a:lstStyle>
+          <a:p>
+            <a:fld id="{A8AD5D7F-330E-402B-A70A-9F37E2BDB806}" type="slidenum">
+              <a:rPr lang="en-US" smtClean="0"/>
+              <a:t>‹N°›</a:t>
+            </a:fld>
+            <a:endParaRPr lang="en-US"/>
+          </a:p>
+        </p:txBody>
+      </p:sp>
+    </p:spTree>
+    <p:extLst>
+      <p:ext uri="{BB962C8B-B14F-4D97-AF65-F5344CB8AC3E}">
+        <p14:creationId xmlns:p14="http://schemas.microsoft.com/office/powerpoint/2010/main" val="4012089263"/>
+      </p:ext>
+    </p:extLst>
+  </p:cSld>
+  <p:clrMap bg1="lt1" tx1="dk1" bg2="lt2" tx2="dk2" accent1="accent1" accent2="accent2" accent3="accent3" accent4="accent4" accent5="accent5" accent6="accent6" hlink="hlink" folHlink="folHlink"/>
+  <p:notesStyle>
+    <a:lvl1pPr marL="0" algn="l" defTabSz="914400" rtl="0" eaLnBrk="1" latinLnBrk="0" hangingPunct="1">
+      <a:defRPr sz="1200" kern="1200">
+        <a:solidFill>
+          <a:schemeClr val="tx1"/>
+        </a:solidFill>
+        <a:latin typeface="+mn-lt"/>
+        <a:ea typeface="+mn-ea"/>
+        <a:cs typeface="+mn-cs"/>
+      </a:defRPr>
+    </a:lvl1pPr>
+    <a:lvl2pPr marL="457200" algn="l" defTabSz="914400" rtl="0" eaLnBrk="1" latinLnBrk="0" hangingPunct="1">
+      <a:defRPr sz="1200" kern="1200">
+        <a:solidFill>
+          <a:schemeClr val="tx1"/>
+        </a:solidFill>
+        <a:latin typeface="+mn-lt"/>
+        <a:ea typeface="+mn-ea"/>
+        <a:cs typeface="+mn-cs"/>
+      </a:defRPr>
+    </a:lvl2pPr>
+    <a:lvl3pPr marL="914400" algn="l" defTabSz="914400" rtl="0" eaLnBrk="1" latinLnBrk="0" hangingPunct="1">
+      <a:defRPr sz="1200" kern="1200">
+        <a:solidFill>
+          <a:schemeClr val="tx1"/>
+        </a:solidFill>
+        <a:latin typeface="+mn-lt"/>
+        <a:ea typeface="+mn-ea"/>
+        <a:cs typeface="+mn-cs"/>
+      </a:defRPr>
+    </a:lvl3pPr>
+    <a:lvl4pPr marL="1371600" algn="l" defTabSz="914400" rtl="0" eaLnBrk="1" latinLnBrk="0" hangingPunct="1">
+      <a:defRPr sz="1200" kern="1200">
+        <a:solidFill>
+          <a:schemeClr val="tx1"/>
+        </a:solidFill>
+        <a:latin typeface="+mn-lt"/>
+        <a:ea typeface="+mn-ea"/>
+        <a:cs typeface="+mn-cs"/>
+      </a:defRPr>
+    </a:lvl4pPr>
+    <a:lvl5pPr marL="1828800" algn="l" defTabSz="914400" rtl="0" eaLnBrk="1" latinLnBrk="0" hangingPunct="1">
+      <a:defRPr sz="1200" kern="1200">
+        <a:solidFill>
+          <a:schemeClr val="tx1"/>
+        </a:solidFill>
+        <a:latin typeface="+mn-lt"/>
+        <a:ea typeface="+mn-ea"/>
+        <a:cs typeface="+mn-cs"/>
+      </a:defRPr>
+    </a:lvl5pPr>
+    <a:lvl6pPr marL="2286000" algn="l" defTabSz="914400" rtl="0" eaLnBrk="1" latinLnBrk="0" hangingPunct="1">
+      <a:defRPr sz="1200" kern="1200">
+        <a:solidFill>
+          <a:schemeClr val="tx1"/>
+        </a:solidFill>
+        <a:latin typeface="+mn-lt"/>
+        <a:ea typeface="+mn-ea"/>
+        <a:cs typeface="+mn-cs"/>
+      </a:defRPr>
+    </a:lvl6pPr>
+    <a:lvl7pPr marL="2743200" algn="l" defTabSz="914400" rtl="0" eaLnBrk="1" latinLnBrk="0" hangingPunct="1">
+      <a:defRPr sz="1200" kern="1200">
+        <a:solidFill>
+          <a:schemeClr val="tx1"/>
+        </a:solidFill>
+        <a:latin typeface="+mn-lt"/>
+        <a:ea typeface="+mn-ea"/>
+        <a:cs typeface="+mn-cs"/>
+      </a:defRPr>
+    </a:lvl7pPr>
+    <a:lvl8pPr marL="3200400" algn="l" defTabSz="914400" rtl="0" eaLnBrk="1" latinLnBrk="0" hangingPunct="1">
+      <a:defRPr sz="1200" kern="1200">
+        <a:solidFill>
+          <a:schemeClr val="tx1"/>
+        </a:solidFill>
+        <a:latin typeface="+mn-lt"/>
+        <a:ea typeface="+mn-ea"/>
+        <a:cs typeface="+mn-cs"/>
+      </a:defRPr>
+    </a:lvl8pPr>
+    <a:lvl9pPr marL="3657600" algn="l" defTabSz="914400" rtl="0" eaLnBrk="1" latinLnBrk="0" hangingPunct="1">
+      <a:defRPr sz="1200" kern="1200">
+        <a:solidFill>
+          <a:schemeClr val="tx1"/>
+        </a:solidFill>
+        <a:latin typeface="+mn-lt"/>
+        <a:ea typeface="+mn-ea"/>
+        <a:cs typeface="+mn-cs"/>
+      </a:defRPr>
+    </a:lvl9pPr>
+  </p:notesStyle>
+</p:notesMaster>
+</file>
+
 <file path=ppt/slideLayouts/slideLayout1.xml><?xml version="1.0" encoding="utf-8"?>
 <p:sldLayout xmlns:a="http://schemas.openxmlformats.org/drawingml/2006/main" xmlns:r="http://schemas.openxmlformats.org/officeDocument/2006/relationships" xmlns:p="http://schemas.openxmlformats.org/presentationml/2006/main" showMasterSp="0" type="title" preserve="1">
   <p:cSld name="Diapositive de titre">
@@ -340,9 +702,9 @@
           <a:bodyPr/>
           <a:lstStyle/>
           <a:p>
-            <a:fld id="{AA309A6D-C09C-4548-B29A-6CF363A7E532}" type="datetimeFigureOut">
-              <a:rPr lang="fr-FR" smtClean="0"/>
-              <a:t>16/05/2015</a:t>
+            <a:fld id="{FE661315-A8A1-4819-97CA-E926694811CD}" type="datetime1">
+              <a:rPr lang="fr-FR" smtClean="0"/>
+              <a:t>17/05/2015</a:t>
             </a:fld>
             <a:endParaRPr lang="fr-BE"/>
           </a:p>
@@ -363,6 +725,10 @@
           <a:bodyPr/>
           <a:lstStyle/>
           <a:p>
+            <a:r>
+              <a:rPr lang="fr-BE" smtClean="0"/>
+              <a:t>Big Data 2015</a:t>
+            </a:r>
             <a:endParaRPr lang="fr-BE"/>
           </a:p>
         </p:txBody>
@@ -553,9 +919,9 @@
           <a:bodyPr/>
           <a:lstStyle/>
           <a:p>
-            <a:fld id="{AA309A6D-C09C-4548-B29A-6CF363A7E532}" type="datetimeFigureOut">
-              <a:rPr lang="fr-FR" smtClean="0"/>
-              <a:t>16/05/2015</a:t>
+            <a:fld id="{EEE34369-7276-491D-9270-E6BCE22D9E8B}" type="datetime1">
+              <a:rPr lang="fr-FR" smtClean="0"/>
+              <a:t>17/05/2015</a:t>
             </a:fld>
             <a:endParaRPr lang="fr-BE"/>
           </a:p>
@@ -576,6 +942,10 @@
           <a:bodyPr/>
           <a:lstStyle/>
           <a:p>
+            <a:r>
+              <a:rPr lang="fr-BE" smtClean="0"/>
+              <a:t>Big Data 2015</a:t>
+            </a:r>
             <a:endParaRPr lang="fr-BE"/>
           </a:p>
         </p:txBody>
@@ -728,9 +1098,9 @@
           <a:bodyPr/>
           <a:lstStyle/>
           <a:p>
-            <a:fld id="{AA309A6D-C09C-4548-B29A-6CF363A7E532}" type="datetimeFigureOut">
-              <a:rPr lang="fr-FR" smtClean="0"/>
-              <a:t>16/05/2015</a:t>
+            <a:fld id="{72EFA682-5356-43AD-B75F-4936FD32B550}" type="datetime1">
+              <a:rPr lang="fr-FR" smtClean="0"/>
+              <a:t>17/05/2015</a:t>
             </a:fld>
             <a:endParaRPr lang="fr-BE"/>
           </a:p>
@@ -751,6 +1121,10 @@
           <a:bodyPr/>
           <a:lstStyle/>
           <a:p>
+            <a:r>
+              <a:rPr lang="fr-BE" smtClean="0"/>
+              <a:t>Big Data 2015</a:t>
+            </a:r>
             <a:endParaRPr lang="fr-BE"/>
           </a:p>
         </p:txBody>
@@ -893,9 +1267,9 @@
           <a:bodyPr/>
           <a:lstStyle/>
           <a:p>
-            <a:fld id="{AA309A6D-C09C-4548-B29A-6CF363A7E532}" type="datetimeFigureOut">
-              <a:rPr lang="fr-FR" smtClean="0"/>
-              <a:t>16/05/2015</a:t>
+            <a:fld id="{5EE11AFD-8E35-47AD-AB3C-5345372F3099}" type="datetime1">
+              <a:rPr lang="fr-FR" smtClean="0"/>
+              <a:t>17/05/2015</a:t>
             </a:fld>
             <a:endParaRPr lang="fr-BE"/>
           </a:p>
@@ -916,6 +1290,10 @@
           <a:bodyPr/>
           <a:lstStyle/>
           <a:p>
+            <a:r>
+              <a:rPr lang="fr-BE" smtClean="0"/>
+              <a:t>Big Data 2015</a:t>
+            </a:r>
             <a:endParaRPr lang="fr-BE"/>
           </a:p>
         </p:txBody>
@@ -1184,9 +1562,9 @@
           <a:bodyPr/>
           <a:lstStyle/>
           <a:p>
-            <a:fld id="{AA309A6D-C09C-4548-B29A-6CF363A7E532}" type="datetimeFigureOut">
-              <a:rPr lang="fr-FR" smtClean="0"/>
-              <a:t>16/05/2015</a:t>
+            <a:fld id="{E5668850-6D7F-4974-A16C-671B524606FC}" type="datetime1">
+              <a:rPr lang="fr-FR" smtClean="0"/>
+              <a:t>17/05/2015</a:t>
             </a:fld>
             <a:endParaRPr lang="fr-BE"/>
           </a:p>
@@ -1207,6 +1585,10 @@
           <a:bodyPr/>
           <a:lstStyle/>
           <a:p>
+            <a:r>
+              <a:rPr lang="fr-BE" smtClean="0"/>
+              <a:t>Big Data 2015</a:t>
+            </a:r>
             <a:endParaRPr lang="fr-BE"/>
           </a:p>
         </p:txBody>
@@ -1510,9 +1892,9 @@
           <a:bodyPr/>
           <a:lstStyle/>
           <a:p>
-            <a:fld id="{AA309A6D-C09C-4548-B29A-6CF363A7E532}" type="datetimeFigureOut">
-              <a:rPr lang="fr-FR" smtClean="0"/>
-              <a:t>16/05/2015</a:t>
+            <a:fld id="{08A71618-6370-48E8-B2FD-E7C826D9225E}" type="datetime1">
+              <a:rPr lang="fr-FR" smtClean="0"/>
+              <a:t>17/05/2015</a:t>
             </a:fld>
             <a:endParaRPr lang="fr-BE"/>
           </a:p>
@@ -1533,6 +1915,10 @@
           <a:bodyPr/>
           <a:lstStyle/>
           <a:p>
+            <a:r>
+              <a:rPr lang="fr-BE" smtClean="0"/>
+              <a:t>Big Data 2015</a:t>
+            </a:r>
             <a:endParaRPr lang="fr-BE"/>
           </a:p>
         </p:txBody>
@@ -1935,9 +2321,9 @@
           <a:bodyPr/>
           <a:lstStyle/>
           <a:p>
-            <a:fld id="{AA309A6D-C09C-4548-B29A-6CF363A7E532}" type="datetimeFigureOut">
-              <a:rPr lang="fr-FR" smtClean="0"/>
-              <a:t>16/05/2015</a:t>
+            <a:fld id="{5D573D87-D5DC-448D-BD1D-A518E3E6A31C}" type="datetime1">
+              <a:rPr lang="fr-FR" smtClean="0"/>
+              <a:t>17/05/2015</a:t>
             </a:fld>
             <a:endParaRPr lang="fr-BE"/>
           </a:p>
@@ -1958,6 +2344,10 @@
           <a:bodyPr/>
           <a:lstStyle/>
           <a:p>
+            <a:r>
+              <a:rPr lang="fr-BE" smtClean="0"/>
+              <a:t>Big Data 2015</a:t>
+            </a:r>
             <a:endParaRPr lang="fr-BE"/>
           </a:p>
         </p:txBody>
@@ -2108,9 +2498,9 @@
           <a:bodyPr/>
           <a:lstStyle/>
           <a:p>
-            <a:fld id="{AA309A6D-C09C-4548-B29A-6CF363A7E532}" type="datetimeFigureOut">
-              <a:rPr lang="fr-FR" smtClean="0"/>
-              <a:t>16/05/2015</a:t>
+            <a:fld id="{D08735CB-C88E-4104-8CB5-15E835EA0C65}" type="datetime1">
+              <a:rPr lang="fr-FR" smtClean="0"/>
+              <a:t>17/05/2015</a:t>
             </a:fld>
             <a:endParaRPr lang="fr-BE"/>
           </a:p>
@@ -2131,6 +2521,10 @@
           <a:bodyPr/>
           <a:lstStyle/>
           <a:p>
+            <a:r>
+              <a:rPr lang="fr-BE" smtClean="0"/>
+              <a:t>Big Data 2015</a:t>
+            </a:r>
             <a:endParaRPr lang="fr-BE"/>
           </a:p>
         </p:txBody>
@@ -2198,9 +2592,9 @@
           <a:bodyPr/>
           <a:lstStyle/>
           <a:p>
-            <a:fld id="{AA309A6D-C09C-4548-B29A-6CF363A7E532}" type="datetimeFigureOut">
-              <a:rPr lang="fr-FR" smtClean="0"/>
-              <a:t>16/05/2015</a:t>
+            <a:fld id="{6C9DCFDC-7510-40A5-92BC-511B60E0E99E}" type="datetime1">
+              <a:rPr lang="fr-FR" smtClean="0"/>
+              <a:t>17/05/2015</a:t>
             </a:fld>
             <a:endParaRPr lang="fr-BE"/>
           </a:p>
@@ -2221,6 +2615,10 @@
           <a:bodyPr/>
           <a:lstStyle/>
           <a:p>
+            <a:r>
+              <a:rPr lang="fr-BE" smtClean="0"/>
+              <a:t>Big Data 2015</a:t>
+            </a:r>
             <a:endParaRPr lang="fr-BE"/>
           </a:p>
         </p:txBody>
@@ -2478,9 +2876,9 @@
           <a:bodyPr/>
           <a:lstStyle/>
           <a:p>
-            <a:fld id="{AA309A6D-C09C-4548-B29A-6CF363A7E532}" type="datetimeFigureOut">
-              <a:rPr lang="fr-FR" smtClean="0"/>
-              <a:t>16/05/2015</a:t>
+            <a:fld id="{CF6C25D7-C485-4718-8412-66C665E47953}" type="datetime1">
+              <a:rPr lang="fr-FR" smtClean="0"/>
+              <a:t>17/05/2015</a:t>
             </a:fld>
             <a:endParaRPr lang="fr-BE"/>
           </a:p>
@@ -2501,6 +2899,10 @@
           <a:bodyPr/>
           <a:lstStyle/>
           <a:p>
+            <a:r>
+              <a:rPr lang="fr-BE" smtClean="0"/>
+              <a:t>Big Data 2015</a:t>
+            </a:r>
             <a:endParaRPr lang="fr-BE"/>
           </a:p>
         </p:txBody>
@@ -2777,9 +3179,9 @@
           <a:bodyPr/>
           <a:lstStyle/>
           <a:p>
-            <a:fld id="{AA309A6D-C09C-4548-B29A-6CF363A7E532}" type="datetimeFigureOut">
-              <a:rPr lang="fr-FR" smtClean="0"/>
-              <a:t>16/05/2015</a:t>
+            <a:fld id="{9F26FDD5-8440-4347-8B47-12CFFB66A246}" type="datetime1">
+              <a:rPr lang="fr-FR" smtClean="0"/>
+              <a:t>17/05/2015</a:t>
             </a:fld>
             <a:endParaRPr lang="fr-BE"/>
           </a:p>
@@ -2800,6 +3202,10 @@
           <a:bodyPr/>
           <a:lstStyle/>
           <a:p>
+            <a:r>
+              <a:rPr lang="fr-BE" smtClean="0"/>
+              <a:t>Big Data 2015</a:t>
+            </a:r>
             <a:endParaRPr lang="fr-BE"/>
           </a:p>
         </p:txBody>
@@ -2987,9 +3393,9 @@
             </a:lvl1pPr>
           </a:lstStyle>
           <a:p>
-            <a:fld id="{AA309A6D-C09C-4548-B29A-6CF363A7E532}" type="datetimeFigureOut">
-              <a:rPr lang="fr-FR" smtClean="0"/>
-              <a:t>16/05/2015</a:t>
+            <a:fld id="{FA3ECA0F-827F-4589-B01E-359596EAA4EE}" type="datetime1">
+              <a:rPr lang="fr-FR" smtClean="0"/>
+              <a:t>17/05/2015</a:t>
             </a:fld>
             <a:endParaRPr lang="fr-BE"/>
           </a:p>
@@ -3029,6 +3435,10 @@
             </a:lvl1pPr>
           </a:lstStyle>
           <a:p>
+            <a:r>
+              <a:rPr lang="fr-BE" smtClean="0"/>
+              <a:t>Big Data 2015</a:t>
+            </a:r>
             <a:endParaRPr lang="fr-BE"/>
           </a:p>
         </p:txBody>
@@ -3226,6 +3636,7 @@
       </p:par>
     </p:tnLst>
   </p:timing>
+  <p:hf hdr="0" dt="0"/>
   <p:txStyles>
     <p:titleStyle>
       <a:lvl1pPr algn="l" defTabSz="914400" rtl="0" eaLnBrk="1" latinLnBrk="0" hangingPunct="1">
@@ -3622,9 +4033,59 @@
           <a:p>
             <a:r>
               <a:rPr lang="en-US" dirty="0" smtClean="0"/>
-              <a:t>Reversing the n-gram search</a:t>
+              <a:t>Reversing the </a:t>
+            </a:r>
+            <a:r>
+              <a:rPr lang="en-US" dirty="0" smtClean="0"/>
+              <a:t>n-grams searching process</a:t>
             </a:r>
             <a:endParaRPr lang="en-US" dirty="0"/>
+          </a:p>
+        </p:txBody>
+      </p:sp>
+      <p:sp>
+        <p:nvSpPr>
+          <p:cNvPr id="4" name="Espace réservé du pied de page 3"/>
+          <p:cNvSpPr>
+            <a:spLocks noGrp="1"/>
+          </p:cNvSpPr>
+          <p:nvPr>
+            <p:ph type="ftr" sz="quarter" idx="11"/>
+          </p:nvPr>
+        </p:nvSpPr>
+        <p:spPr/>
+        <p:txBody>
+          <a:bodyPr/>
+          <a:lstStyle/>
+          <a:p>
+            <a:r>
+              <a:rPr lang="fr-BE" smtClean="0"/>
+              <a:t>Big Data 2015</a:t>
+            </a:r>
+            <a:endParaRPr lang="fr-BE"/>
+          </a:p>
+        </p:txBody>
+      </p:sp>
+      <p:sp>
+        <p:nvSpPr>
+          <p:cNvPr id="5" name="Espace réservé du numéro de diapositive 4"/>
+          <p:cNvSpPr>
+            <a:spLocks noGrp="1"/>
+          </p:cNvSpPr>
+          <p:nvPr>
+            <p:ph type="sldNum" sz="quarter" idx="12"/>
+          </p:nvPr>
+        </p:nvSpPr>
+        <p:spPr/>
+        <p:txBody>
+          <a:bodyPr/>
+          <a:lstStyle/>
+          <a:p>
+            <a:fld id="{CF4668DC-857F-487D-BFFA-8C0CA5037977}" type="slidenum">
+              <a:rPr lang="fr-BE" smtClean="0"/>
+              <a:t>1</a:t>
+            </a:fld>
+            <a:endParaRPr lang="fr-BE"/>
           </a:p>
         </p:txBody>
       </p:sp>
@@ -3632,6 +4093,851 @@
     <p:extLst>
       <p:ext uri="{BB962C8B-B14F-4D97-AF65-F5344CB8AC3E}">
         <p14:creationId xmlns:p14="http://schemas.microsoft.com/office/powerpoint/2010/main" val="314102207"/>
+      </p:ext>
+    </p:extLst>
+  </p:cSld>
+  <p:clrMapOvr>
+    <a:masterClrMapping/>
+  </p:clrMapOvr>
+</p:sld>
+</file>
+
+<file path=ppt/slides/slide10.xml><?xml version="1.0" encoding="utf-8"?>
+<p:sld xmlns:a="http://schemas.openxmlformats.org/drawingml/2006/main" xmlns:r="http://schemas.openxmlformats.org/officeDocument/2006/relationships" xmlns:p="http://schemas.openxmlformats.org/presentationml/2006/main">
+  <p:cSld>
+    <p:spTree>
+      <p:nvGrpSpPr>
+        <p:cNvPr id="1" name=""/>
+        <p:cNvGrpSpPr/>
+        <p:nvPr/>
+      </p:nvGrpSpPr>
+      <p:grpSpPr>
+        <a:xfrm>
+          <a:off x="0" y="0"/>
+          <a:ext cx="0" cy="0"/>
+          <a:chOff x="0" y="0"/>
+          <a:chExt cx="0" cy="0"/>
+        </a:xfrm>
+      </p:grpSpPr>
+      <p:sp>
+        <p:nvSpPr>
+          <p:cNvPr id="2" name="Titre 1"/>
+          <p:cNvSpPr>
+            <a:spLocks noGrp="1"/>
+          </p:cNvSpPr>
+          <p:nvPr>
+            <p:ph type="title"/>
+          </p:nvPr>
+        </p:nvSpPr>
+        <p:spPr/>
+        <p:txBody>
+          <a:bodyPr>
+            <a:normAutofit/>
+          </a:bodyPr>
+          <a:lstStyle/>
+          <a:p>
+            <a:r>
+              <a:rPr lang="en-US" dirty="0" smtClean="0"/>
+              <a:t>combats</a:t>
+            </a:r>
+            <a:endParaRPr lang="en-US" dirty="0"/>
+          </a:p>
+        </p:txBody>
+      </p:sp>
+      <p:pic>
+        <p:nvPicPr>
+          <p:cNvPr id="5" name="Espace réservé du contenu 4"/>
+          <p:cNvPicPr>
+            <a:picLocks noGrp="1" noChangeAspect="1"/>
+          </p:cNvPicPr>
+          <p:nvPr>
+            <p:ph idx="1"/>
+          </p:nvPr>
+        </p:nvPicPr>
+        <p:blipFill>
+          <a:blip r:embed="rId2">
+            <a:extLst>
+              <a:ext uri="{28A0092B-C50C-407E-A947-70E740481C1C}">
+                <a14:useLocalDpi xmlns:a14="http://schemas.microsoft.com/office/drawing/2010/main" val="0"/>
+              </a:ext>
+            </a:extLst>
+          </a:blip>
+          <a:stretch>
+            <a:fillRect/>
+          </a:stretch>
+        </p:blipFill>
+        <p:spPr>
+          <a:xfrm>
+            <a:off x="449317" y="476672"/>
+            <a:ext cx="8371155" cy="4781170"/>
+          </a:xfrm>
+          <a:prstGeom prst="rect">
+            <a:avLst/>
+          </a:prstGeom>
+          <a:ln w="38100" cap="sq">
+            <a:solidFill>
+              <a:srgbClr val="000000"/>
+            </a:solidFill>
+            <a:prstDash val="solid"/>
+            <a:miter lim="800000"/>
+          </a:ln>
+          <a:effectLst>
+            <a:outerShdw blurRad="50800" dist="38100" dir="2700000" algn="tl" rotWithShape="0">
+              <a:srgbClr val="000000">
+                <a:alpha val="43000"/>
+              </a:srgbClr>
+            </a:outerShdw>
+          </a:effectLst>
+        </p:spPr>
+      </p:pic>
+      <p:sp>
+        <p:nvSpPr>
+          <p:cNvPr id="6" name="Espace réservé du pied de page 5"/>
+          <p:cNvSpPr>
+            <a:spLocks noGrp="1"/>
+          </p:cNvSpPr>
+          <p:nvPr>
+            <p:ph type="ftr" sz="quarter" idx="11"/>
+          </p:nvPr>
+        </p:nvSpPr>
+        <p:spPr/>
+        <p:txBody>
+          <a:bodyPr/>
+          <a:lstStyle/>
+          <a:p>
+            <a:r>
+              <a:rPr lang="fr-BE" smtClean="0"/>
+              <a:t>Big Data 2015</a:t>
+            </a:r>
+            <a:endParaRPr lang="fr-BE"/>
+          </a:p>
+        </p:txBody>
+      </p:sp>
+      <p:sp>
+        <p:nvSpPr>
+          <p:cNvPr id="7" name="Espace réservé du numéro de diapositive 6"/>
+          <p:cNvSpPr>
+            <a:spLocks noGrp="1"/>
+          </p:cNvSpPr>
+          <p:nvPr>
+            <p:ph type="sldNum" sz="quarter" idx="12"/>
+          </p:nvPr>
+        </p:nvSpPr>
+        <p:spPr/>
+        <p:txBody>
+          <a:bodyPr/>
+          <a:lstStyle/>
+          <a:p>
+            <a:fld id="{CF4668DC-857F-487D-BFFA-8C0CA5037977}" type="slidenum">
+              <a:rPr lang="fr-BE" smtClean="0"/>
+              <a:t>10</a:t>
+            </a:fld>
+            <a:endParaRPr lang="fr-BE"/>
+          </a:p>
+        </p:txBody>
+      </p:sp>
+    </p:spTree>
+    <p:extLst>
+      <p:ext uri="{BB962C8B-B14F-4D97-AF65-F5344CB8AC3E}">
+        <p14:creationId xmlns:p14="http://schemas.microsoft.com/office/powerpoint/2010/main" val="506976815"/>
+      </p:ext>
+    </p:extLst>
+  </p:cSld>
+  <p:clrMapOvr>
+    <a:masterClrMapping/>
+  </p:clrMapOvr>
+  <p:timing>
+    <p:tnLst>
+      <p:par>
+        <p:cTn id="1" dur="indefinite" restart="never" nodeType="tmRoot"/>
+      </p:par>
+    </p:tnLst>
+  </p:timing>
+</p:sld>
+</file>
+
+<file path=ppt/slides/slide11.xml><?xml version="1.0" encoding="utf-8"?>
+<p:sld xmlns:a="http://schemas.openxmlformats.org/drawingml/2006/main" xmlns:r="http://schemas.openxmlformats.org/officeDocument/2006/relationships" xmlns:p="http://schemas.openxmlformats.org/presentationml/2006/main">
+  <p:cSld>
+    <p:spTree>
+      <p:nvGrpSpPr>
+        <p:cNvPr id="1" name=""/>
+        <p:cNvGrpSpPr/>
+        <p:nvPr/>
+      </p:nvGrpSpPr>
+      <p:grpSpPr>
+        <a:xfrm>
+          <a:off x="0" y="0"/>
+          <a:ext cx="0" cy="0"/>
+          <a:chOff x="0" y="0"/>
+          <a:chExt cx="0" cy="0"/>
+        </a:xfrm>
+      </p:grpSpPr>
+      <p:sp>
+        <p:nvSpPr>
+          <p:cNvPr id="2" name="Titre 1"/>
+          <p:cNvSpPr>
+            <a:spLocks noGrp="1"/>
+          </p:cNvSpPr>
+          <p:nvPr>
+            <p:ph type="title"/>
+          </p:nvPr>
+        </p:nvSpPr>
+        <p:spPr/>
+        <p:txBody>
+          <a:bodyPr>
+            <a:normAutofit/>
+          </a:bodyPr>
+          <a:lstStyle/>
+          <a:p>
+            <a:r>
+              <a:rPr lang="en-US" dirty="0" smtClean="0"/>
+              <a:t>combats &amp; </a:t>
+            </a:r>
+            <a:r>
+              <a:rPr lang="en-US" dirty="0" err="1" smtClean="0"/>
+              <a:t>hauteurs</a:t>
+            </a:r>
+            <a:endParaRPr lang="en-US" dirty="0"/>
+          </a:p>
+        </p:txBody>
+      </p:sp>
+      <p:pic>
+        <p:nvPicPr>
+          <p:cNvPr id="5" name="Espace réservé du contenu 4"/>
+          <p:cNvPicPr>
+            <a:picLocks noGrp="1" noChangeAspect="1"/>
+          </p:cNvPicPr>
+          <p:nvPr>
+            <p:ph idx="1"/>
+          </p:nvPr>
+        </p:nvPicPr>
+        <p:blipFill>
+          <a:blip r:embed="rId2">
+            <a:extLst>
+              <a:ext uri="{28A0092B-C50C-407E-A947-70E740481C1C}">
+                <a14:useLocalDpi xmlns:a14="http://schemas.microsoft.com/office/drawing/2010/main" val="0"/>
+              </a:ext>
+            </a:extLst>
+          </a:blip>
+          <a:stretch>
+            <a:fillRect/>
+          </a:stretch>
+        </p:blipFill>
+        <p:spPr>
+          <a:xfrm>
+            <a:off x="705889" y="476672"/>
+            <a:ext cx="7858011" cy="4781170"/>
+          </a:xfrm>
+          <a:prstGeom prst="rect">
+            <a:avLst/>
+          </a:prstGeom>
+          <a:ln w="38100" cap="sq">
+            <a:solidFill>
+              <a:srgbClr val="000000"/>
+            </a:solidFill>
+            <a:prstDash val="solid"/>
+            <a:miter lim="800000"/>
+          </a:ln>
+          <a:effectLst>
+            <a:outerShdw blurRad="50800" dist="38100" dir="2700000" algn="tl" rotWithShape="0">
+              <a:srgbClr val="000000">
+                <a:alpha val="43000"/>
+              </a:srgbClr>
+            </a:outerShdw>
+          </a:effectLst>
+        </p:spPr>
+      </p:pic>
+      <p:sp>
+        <p:nvSpPr>
+          <p:cNvPr id="3" name="Espace réservé du pied de page 2"/>
+          <p:cNvSpPr>
+            <a:spLocks noGrp="1"/>
+          </p:cNvSpPr>
+          <p:nvPr>
+            <p:ph type="ftr" sz="quarter" idx="11"/>
+          </p:nvPr>
+        </p:nvSpPr>
+        <p:spPr/>
+        <p:txBody>
+          <a:bodyPr/>
+          <a:lstStyle/>
+          <a:p>
+            <a:r>
+              <a:rPr lang="fr-BE" smtClean="0"/>
+              <a:t>Big Data 2015</a:t>
+            </a:r>
+            <a:endParaRPr lang="fr-BE"/>
+          </a:p>
+        </p:txBody>
+      </p:sp>
+      <p:sp>
+        <p:nvSpPr>
+          <p:cNvPr id="4" name="Espace réservé du numéro de diapositive 3"/>
+          <p:cNvSpPr>
+            <a:spLocks noGrp="1"/>
+          </p:cNvSpPr>
+          <p:nvPr>
+            <p:ph type="sldNum" sz="quarter" idx="12"/>
+          </p:nvPr>
+        </p:nvSpPr>
+        <p:spPr/>
+        <p:txBody>
+          <a:bodyPr/>
+          <a:lstStyle/>
+          <a:p>
+            <a:fld id="{CF4668DC-857F-487D-BFFA-8C0CA5037977}" type="slidenum">
+              <a:rPr lang="fr-BE" smtClean="0"/>
+              <a:t>11</a:t>
+            </a:fld>
+            <a:endParaRPr lang="fr-BE"/>
+          </a:p>
+        </p:txBody>
+      </p:sp>
+    </p:spTree>
+    <p:extLst>
+      <p:ext uri="{BB962C8B-B14F-4D97-AF65-F5344CB8AC3E}">
+        <p14:creationId xmlns:p14="http://schemas.microsoft.com/office/powerpoint/2010/main" val="2968272352"/>
+      </p:ext>
+    </p:extLst>
+  </p:cSld>
+  <p:clrMapOvr>
+    <a:masterClrMapping/>
+  </p:clrMapOvr>
+  <p:timing>
+    <p:tnLst>
+      <p:par>
+        <p:cTn id="1" dur="indefinite" restart="never" nodeType="tmRoot"/>
+      </p:par>
+    </p:tnLst>
+  </p:timing>
+</p:sld>
+</file>
+
+<file path=ppt/slides/slide12.xml><?xml version="1.0" encoding="utf-8"?>
+<p:sld xmlns:a="http://schemas.openxmlformats.org/drawingml/2006/main" xmlns:r="http://schemas.openxmlformats.org/officeDocument/2006/relationships" xmlns:p="http://schemas.openxmlformats.org/presentationml/2006/main">
+  <p:cSld>
+    <p:spTree>
+      <p:nvGrpSpPr>
+        <p:cNvPr id="1" name=""/>
+        <p:cNvGrpSpPr/>
+        <p:nvPr/>
+      </p:nvGrpSpPr>
+      <p:grpSpPr>
+        <a:xfrm>
+          <a:off x="0" y="0"/>
+          <a:ext cx="0" cy="0"/>
+          <a:chOff x="0" y="0"/>
+          <a:chExt cx="0" cy="0"/>
+        </a:xfrm>
+      </p:grpSpPr>
+      <p:sp>
+        <p:nvSpPr>
+          <p:cNvPr id="2" name="Titre 1"/>
+          <p:cNvSpPr>
+            <a:spLocks noGrp="1"/>
+          </p:cNvSpPr>
+          <p:nvPr>
+            <p:ph type="title"/>
+          </p:nvPr>
+        </p:nvSpPr>
+        <p:spPr>
+          <a:xfrm>
+            <a:off x="762000" y="5229200"/>
+            <a:ext cx="6781800" cy="943000"/>
+          </a:xfrm>
+        </p:spPr>
+        <p:txBody>
+          <a:bodyPr/>
+          <a:lstStyle/>
+          <a:p>
+            <a:r>
+              <a:rPr lang="en-US" dirty="0" smtClean="0"/>
+              <a:t>Conclusion</a:t>
+            </a:r>
+            <a:endParaRPr lang="en-US" dirty="0"/>
+          </a:p>
+        </p:txBody>
+      </p:sp>
+      <p:sp>
+        <p:nvSpPr>
+          <p:cNvPr id="3" name="Espace réservé du contenu 2"/>
+          <p:cNvSpPr>
+            <a:spLocks noGrp="1"/>
+          </p:cNvSpPr>
+          <p:nvPr>
+            <p:ph idx="1"/>
+          </p:nvPr>
+        </p:nvSpPr>
+        <p:spPr/>
+        <p:txBody>
+          <a:bodyPr/>
+          <a:lstStyle/>
+          <a:p>
+            <a:r>
+              <a:rPr lang="en-US" dirty="0" smtClean="0"/>
+              <a:t>Can help linguistic studies</a:t>
+            </a:r>
+          </a:p>
+          <a:p>
+            <a:r>
+              <a:rPr lang="en-US" dirty="0" smtClean="0"/>
+              <a:t>Gives hints on where to look at</a:t>
+            </a:r>
+          </a:p>
+          <a:p>
+            <a:r>
+              <a:rPr lang="en-US" dirty="0" smtClean="0"/>
+              <a:t>Still needs some global intuition</a:t>
+            </a:r>
+            <a:endParaRPr lang="en-US" dirty="0"/>
+          </a:p>
+        </p:txBody>
+      </p:sp>
+      <p:sp>
+        <p:nvSpPr>
+          <p:cNvPr id="4" name="Espace réservé du pied de page 3"/>
+          <p:cNvSpPr>
+            <a:spLocks noGrp="1"/>
+          </p:cNvSpPr>
+          <p:nvPr>
+            <p:ph type="ftr" sz="quarter" idx="11"/>
+          </p:nvPr>
+        </p:nvSpPr>
+        <p:spPr/>
+        <p:txBody>
+          <a:bodyPr/>
+          <a:lstStyle/>
+          <a:p>
+            <a:r>
+              <a:rPr lang="fr-BE" smtClean="0"/>
+              <a:t>Big Data 2015</a:t>
+            </a:r>
+            <a:endParaRPr lang="fr-BE"/>
+          </a:p>
+        </p:txBody>
+      </p:sp>
+      <p:sp>
+        <p:nvSpPr>
+          <p:cNvPr id="5" name="Espace réservé du numéro de diapositive 4"/>
+          <p:cNvSpPr>
+            <a:spLocks noGrp="1"/>
+          </p:cNvSpPr>
+          <p:nvPr>
+            <p:ph type="sldNum" sz="quarter" idx="12"/>
+          </p:nvPr>
+        </p:nvSpPr>
+        <p:spPr/>
+        <p:txBody>
+          <a:bodyPr/>
+          <a:lstStyle/>
+          <a:p>
+            <a:fld id="{CF4668DC-857F-487D-BFFA-8C0CA5037977}" type="slidenum">
+              <a:rPr lang="fr-BE" smtClean="0"/>
+              <a:t>12</a:t>
+            </a:fld>
+            <a:endParaRPr lang="fr-BE"/>
+          </a:p>
+        </p:txBody>
+      </p:sp>
+    </p:spTree>
+    <p:extLst>
+      <p:ext uri="{BB962C8B-B14F-4D97-AF65-F5344CB8AC3E}">
+        <p14:creationId xmlns:p14="http://schemas.microsoft.com/office/powerpoint/2010/main" val="3049432432"/>
+      </p:ext>
+    </p:extLst>
+  </p:cSld>
+  <p:clrMapOvr>
+    <a:masterClrMapping/>
+  </p:clrMapOvr>
+</p:sld>
+</file>
+
+<file path=ppt/slides/slide13.xml><?xml version="1.0" encoding="utf-8"?>
+<p:sld xmlns:a="http://schemas.openxmlformats.org/drawingml/2006/main" xmlns:r="http://schemas.openxmlformats.org/officeDocument/2006/relationships" xmlns:p="http://schemas.openxmlformats.org/presentationml/2006/main">
+  <p:cSld>
+    <p:spTree>
+      <p:nvGrpSpPr>
+        <p:cNvPr id="1" name=""/>
+        <p:cNvGrpSpPr/>
+        <p:nvPr/>
+      </p:nvGrpSpPr>
+      <p:grpSpPr>
+        <a:xfrm>
+          <a:off x="0" y="0"/>
+          <a:ext cx="0" cy="0"/>
+          <a:chOff x="0" y="0"/>
+          <a:chExt cx="0" cy="0"/>
+        </a:xfrm>
+      </p:grpSpPr>
+      <p:sp>
+        <p:nvSpPr>
+          <p:cNvPr id="2" name="Titre 1"/>
+          <p:cNvSpPr>
+            <a:spLocks noGrp="1"/>
+          </p:cNvSpPr>
+          <p:nvPr>
+            <p:ph type="title"/>
+          </p:nvPr>
+        </p:nvSpPr>
+        <p:spPr>
+          <a:xfrm>
+            <a:off x="2771800" y="3068960"/>
+            <a:ext cx="3810000" cy="1159024"/>
+          </a:xfrm>
+        </p:spPr>
+        <p:txBody>
+          <a:bodyPr/>
+          <a:lstStyle/>
+          <a:p>
+            <a:r>
+              <a:rPr lang="en-US" dirty="0" smtClean="0"/>
+              <a:t>Thank you!</a:t>
+            </a:r>
+            <a:endParaRPr lang="en-US" dirty="0"/>
+          </a:p>
+        </p:txBody>
+      </p:sp>
+      <p:sp>
+        <p:nvSpPr>
+          <p:cNvPr id="3" name="Espace réservé du pied de page 2"/>
+          <p:cNvSpPr>
+            <a:spLocks noGrp="1"/>
+          </p:cNvSpPr>
+          <p:nvPr>
+            <p:ph type="ftr" sz="quarter" idx="11"/>
+          </p:nvPr>
+        </p:nvSpPr>
+        <p:spPr/>
+        <p:txBody>
+          <a:bodyPr/>
+          <a:lstStyle/>
+          <a:p>
+            <a:r>
+              <a:rPr lang="fr-BE" smtClean="0"/>
+              <a:t>Big Data 2015</a:t>
+            </a:r>
+            <a:endParaRPr lang="fr-BE"/>
+          </a:p>
+        </p:txBody>
+      </p:sp>
+      <p:sp>
+        <p:nvSpPr>
+          <p:cNvPr id="4" name="Espace réservé du numéro de diapositive 3"/>
+          <p:cNvSpPr>
+            <a:spLocks noGrp="1"/>
+          </p:cNvSpPr>
+          <p:nvPr>
+            <p:ph type="sldNum" sz="quarter" idx="12"/>
+          </p:nvPr>
+        </p:nvSpPr>
+        <p:spPr/>
+        <p:txBody>
+          <a:bodyPr/>
+          <a:lstStyle/>
+          <a:p>
+            <a:fld id="{CF4668DC-857F-487D-BFFA-8C0CA5037977}" type="slidenum">
+              <a:rPr lang="fr-BE" smtClean="0"/>
+              <a:t>13</a:t>
+            </a:fld>
+            <a:endParaRPr lang="fr-BE"/>
+          </a:p>
+        </p:txBody>
+      </p:sp>
+    </p:spTree>
+    <p:extLst>
+      <p:ext uri="{BB962C8B-B14F-4D97-AF65-F5344CB8AC3E}">
+        <p14:creationId xmlns:p14="http://schemas.microsoft.com/office/powerpoint/2010/main" val="3019894892"/>
+      </p:ext>
+    </p:extLst>
+  </p:cSld>
+  <p:clrMapOvr>
+    <a:masterClrMapping/>
+  </p:clrMapOvr>
+</p:sld>
+</file>
+
+<file path=ppt/slides/slide14.xml><?xml version="1.0" encoding="utf-8"?>
+<p:sld xmlns:a="http://schemas.openxmlformats.org/drawingml/2006/main" xmlns:r="http://schemas.openxmlformats.org/officeDocument/2006/relationships" xmlns:p="http://schemas.openxmlformats.org/presentationml/2006/main">
+  <p:cSld>
+    <p:spTree>
+      <p:nvGrpSpPr>
+        <p:cNvPr id="1" name=""/>
+        <p:cNvGrpSpPr/>
+        <p:nvPr/>
+      </p:nvGrpSpPr>
+      <p:grpSpPr>
+        <a:xfrm>
+          <a:off x="0" y="0"/>
+          <a:ext cx="0" cy="0"/>
+          <a:chOff x="0" y="0"/>
+          <a:chExt cx="0" cy="0"/>
+        </a:xfrm>
+      </p:grpSpPr>
+      <p:sp>
+        <p:nvSpPr>
+          <p:cNvPr id="2" name="Titre 1"/>
+          <p:cNvSpPr>
+            <a:spLocks noGrp="1"/>
+          </p:cNvSpPr>
+          <p:nvPr>
+            <p:ph type="title"/>
+          </p:nvPr>
+        </p:nvSpPr>
+        <p:spPr/>
+        <p:txBody>
+          <a:bodyPr/>
+          <a:lstStyle/>
+          <a:p>
+            <a:r>
+              <a:rPr lang="en-US" dirty="0" smtClean="0"/>
+              <a:t>Application flowchart</a:t>
+            </a:r>
+            <a:endParaRPr lang="en-US" dirty="0"/>
+          </a:p>
+        </p:txBody>
+      </p:sp>
+      <p:pic>
+        <p:nvPicPr>
+          <p:cNvPr id="6" name="Espace réservé du contenu 5"/>
+          <p:cNvPicPr>
+            <a:picLocks noGrp="1" noChangeAspect="1"/>
+          </p:cNvPicPr>
+          <p:nvPr>
+            <p:ph idx="1"/>
+          </p:nvPr>
+        </p:nvPicPr>
+        <p:blipFill>
+          <a:blip r:embed="rId2">
+            <a:extLst>
+              <a:ext uri="{28A0092B-C50C-407E-A947-70E740481C1C}">
+                <a14:useLocalDpi xmlns:a14="http://schemas.microsoft.com/office/drawing/2010/main" val="0"/>
+              </a:ext>
+            </a:extLst>
+          </a:blip>
+          <a:stretch>
+            <a:fillRect/>
+          </a:stretch>
+        </p:blipFill>
+        <p:spPr>
+          <a:xfrm>
+            <a:off x="1110498" y="548681"/>
+            <a:ext cx="6917886" cy="4606280"/>
+          </a:xfrm>
+          <a:prstGeom prst="rect">
+            <a:avLst/>
+          </a:prstGeom>
+          <a:ln w="38100" cap="sq">
+            <a:solidFill>
+              <a:srgbClr val="000000"/>
+            </a:solidFill>
+            <a:prstDash val="solid"/>
+            <a:miter lim="800000"/>
+          </a:ln>
+          <a:effectLst>
+            <a:outerShdw blurRad="50800" dist="38100" dir="2700000" algn="tl" rotWithShape="0">
+              <a:srgbClr val="000000">
+                <a:alpha val="43000"/>
+              </a:srgbClr>
+            </a:outerShdw>
+          </a:effectLst>
+        </p:spPr>
+      </p:pic>
+      <p:sp>
+        <p:nvSpPr>
+          <p:cNvPr id="4" name="Espace réservé du pied de page 3"/>
+          <p:cNvSpPr>
+            <a:spLocks noGrp="1"/>
+          </p:cNvSpPr>
+          <p:nvPr>
+            <p:ph type="ftr" sz="quarter" idx="11"/>
+          </p:nvPr>
+        </p:nvSpPr>
+        <p:spPr/>
+        <p:txBody>
+          <a:bodyPr/>
+          <a:lstStyle/>
+          <a:p>
+            <a:r>
+              <a:rPr lang="fr-BE" smtClean="0"/>
+              <a:t>Big Data 2015</a:t>
+            </a:r>
+            <a:endParaRPr lang="fr-BE"/>
+          </a:p>
+        </p:txBody>
+      </p:sp>
+      <p:sp>
+        <p:nvSpPr>
+          <p:cNvPr id="5" name="Espace réservé du numéro de diapositive 4"/>
+          <p:cNvSpPr>
+            <a:spLocks noGrp="1"/>
+          </p:cNvSpPr>
+          <p:nvPr>
+            <p:ph type="sldNum" sz="quarter" idx="12"/>
+          </p:nvPr>
+        </p:nvSpPr>
+        <p:spPr/>
+        <p:txBody>
+          <a:bodyPr/>
+          <a:lstStyle/>
+          <a:p>
+            <a:fld id="{CF4668DC-857F-487D-BFFA-8C0CA5037977}" type="slidenum">
+              <a:rPr lang="fr-BE" smtClean="0"/>
+              <a:t>14</a:t>
+            </a:fld>
+            <a:endParaRPr lang="fr-BE"/>
+          </a:p>
+        </p:txBody>
+      </p:sp>
+    </p:spTree>
+    <p:extLst>
+      <p:ext uri="{BB962C8B-B14F-4D97-AF65-F5344CB8AC3E}">
+        <p14:creationId xmlns:p14="http://schemas.microsoft.com/office/powerpoint/2010/main" val="3432105311"/>
+      </p:ext>
+    </p:extLst>
+  </p:cSld>
+  <p:clrMapOvr>
+    <a:masterClrMapping/>
+  </p:clrMapOvr>
+</p:sld>
+</file>
+
+<file path=ppt/slides/slide15.xml><?xml version="1.0" encoding="utf-8"?>
+<p:sld xmlns:a="http://schemas.openxmlformats.org/drawingml/2006/main" xmlns:r="http://schemas.openxmlformats.org/officeDocument/2006/relationships" xmlns:p="http://schemas.openxmlformats.org/presentationml/2006/main">
+  <p:cSld>
+    <p:spTree>
+      <p:nvGrpSpPr>
+        <p:cNvPr id="1" name=""/>
+        <p:cNvGrpSpPr/>
+        <p:nvPr/>
+      </p:nvGrpSpPr>
+      <p:grpSpPr>
+        <a:xfrm>
+          <a:off x="0" y="0"/>
+          <a:ext cx="0" cy="0"/>
+          <a:chOff x="0" y="0"/>
+          <a:chExt cx="0" cy="0"/>
+        </a:xfrm>
+      </p:grpSpPr>
+      <p:sp>
+        <p:nvSpPr>
+          <p:cNvPr id="2" name="Titre 1"/>
+          <p:cNvSpPr>
+            <a:spLocks noGrp="1"/>
+          </p:cNvSpPr>
+          <p:nvPr>
+            <p:ph type="title"/>
+          </p:nvPr>
+        </p:nvSpPr>
+        <p:spPr/>
+        <p:txBody>
+          <a:bodyPr/>
+          <a:lstStyle/>
+          <a:p>
+            <a:r>
+              <a:rPr lang="en-US" dirty="0" smtClean="0"/>
+              <a:t>Data histogram</a:t>
+            </a:r>
+            <a:endParaRPr lang="en-US" dirty="0"/>
+          </a:p>
+        </p:txBody>
+      </p:sp>
+      <p:pic>
+        <p:nvPicPr>
+          <p:cNvPr id="6" name="Espace réservé du contenu 5"/>
+          <p:cNvPicPr>
+            <a:picLocks noGrp="1" noChangeAspect="1"/>
+          </p:cNvPicPr>
+          <p:nvPr>
+            <p:ph idx="1"/>
+          </p:nvPr>
+        </p:nvPicPr>
+        <p:blipFill>
+          <a:blip r:embed="rId2">
+            <a:extLst>
+              <a:ext uri="{28A0092B-C50C-407E-A947-70E740481C1C}">
+                <a14:useLocalDpi xmlns:a14="http://schemas.microsoft.com/office/drawing/2010/main" val="0"/>
+              </a:ext>
+            </a:extLst>
+          </a:blip>
+          <a:stretch>
+            <a:fillRect/>
+          </a:stretch>
+        </p:blipFill>
+        <p:spPr>
+          <a:xfrm>
+            <a:off x="164907" y="1192142"/>
+            <a:ext cx="8897062" cy="3388986"/>
+          </a:xfrm>
+          <a:prstGeom prst="rect">
+            <a:avLst/>
+          </a:prstGeom>
+          <a:ln w="38100" cap="sq">
+            <a:solidFill>
+              <a:srgbClr val="000000"/>
+            </a:solidFill>
+            <a:prstDash val="solid"/>
+            <a:miter lim="800000"/>
+          </a:ln>
+          <a:effectLst>
+            <a:outerShdw blurRad="50800" dist="38100" dir="2700000" algn="tl" rotWithShape="0">
+              <a:srgbClr val="000000">
+                <a:alpha val="43000"/>
+              </a:srgbClr>
+            </a:outerShdw>
+          </a:effectLst>
+        </p:spPr>
+      </p:pic>
+      <p:sp>
+        <p:nvSpPr>
+          <p:cNvPr id="4" name="Espace réservé du pied de page 3"/>
+          <p:cNvSpPr>
+            <a:spLocks noGrp="1"/>
+          </p:cNvSpPr>
+          <p:nvPr>
+            <p:ph type="ftr" sz="quarter" idx="11"/>
+          </p:nvPr>
+        </p:nvSpPr>
+        <p:spPr/>
+        <p:txBody>
+          <a:bodyPr/>
+          <a:lstStyle/>
+          <a:p>
+            <a:r>
+              <a:rPr lang="fr-BE" smtClean="0"/>
+              <a:t>Big Data 2015</a:t>
+            </a:r>
+            <a:endParaRPr lang="fr-BE"/>
+          </a:p>
+        </p:txBody>
+      </p:sp>
+      <p:sp>
+        <p:nvSpPr>
+          <p:cNvPr id="5" name="Espace réservé du numéro de diapositive 4"/>
+          <p:cNvSpPr>
+            <a:spLocks noGrp="1"/>
+          </p:cNvSpPr>
+          <p:nvPr>
+            <p:ph type="sldNum" sz="quarter" idx="12"/>
+          </p:nvPr>
+        </p:nvSpPr>
+        <p:spPr/>
+        <p:txBody>
+          <a:bodyPr/>
+          <a:lstStyle/>
+          <a:p>
+            <a:fld id="{CF4668DC-857F-487D-BFFA-8C0CA5037977}" type="slidenum">
+              <a:rPr lang="fr-BE" smtClean="0"/>
+              <a:t>15</a:t>
+            </a:fld>
+            <a:endParaRPr lang="fr-BE"/>
+          </a:p>
+        </p:txBody>
+      </p:sp>
+    </p:spTree>
+    <p:extLst>
+      <p:ext uri="{BB962C8B-B14F-4D97-AF65-F5344CB8AC3E}">
+        <p14:creationId xmlns:p14="http://schemas.microsoft.com/office/powerpoint/2010/main" val="1570454263"/>
       </p:ext>
     </p:extLst>
   </p:cSld>
@@ -4353,6 +5659,93 @@
           </a:extLst>
         </p:spPr>
       </p:pic>
+      <p:pic>
+        <p:nvPicPr>
+          <p:cNvPr id="2050" name="Picture 2" descr="D:\Mes Documents\EPFL\Semestre courant\Big Data\smargn\presentation\fabien.jpg"/>
+          <p:cNvPicPr>
+            <a:picLocks noChangeAspect="1" noChangeArrowheads="1"/>
+          </p:cNvPicPr>
+          <p:nvPr/>
+        </p:nvPicPr>
+        <p:blipFill>
+          <a:blip r:embed="rId10" cstate="print">
+            <a:extLst>
+              <a:ext uri="{28A0092B-C50C-407E-A947-70E740481C1C}">
+                <a14:useLocalDpi xmlns:a14="http://schemas.microsoft.com/office/drawing/2010/main" val="0"/>
+              </a:ext>
+            </a:extLst>
+          </a:blip>
+          <a:srcRect/>
+          <a:stretch>
+            <a:fillRect/>
+          </a:stretch>
+        </p:blipFill>
+        <p:spPr bwMode="auto">
+          <a:xfrm>
+            <a:off x="3059832" y="3212976"/>
+            <a:ext cx="1296144" cy="1296144"/>
+          </a:xfrm>
+          <a:prstGeom prst="rect">
+            <a:avLst/>
+          </a:prstGeom>
+          <a:noFill/>
+          <a:extLst>
+            <a:ext uri="{909E8E84-426E-40DD-AFC4-6F175D3DCCD1}">
+              <a14:hiddenFill xmlns:a14="http://schemas.microsoft.com/office/drawing/2010/main">
+                <a:solidFill>
+                  <a:srgbClr val="FFFFFF"/>
+                </a:solidFill>
+              </a14:hiddenFill>
+            </a:ext>
+          </a:extLst>
+        </p:spPr>
+      </p:pic>
+      <p:sp>
+        <p:nvSpPr>
+          <p:cNvPr id="3" name="Espace réservé du pied de page 2"/>
+          <p:cNvSpPr>
+            <a:spLocks noGrp="1"/>
+          </p:cNvSpPr>
+          <p:nvPr>
+            <p:ph type="ftr" sz="quarter" idx="11"/>
+          </p:nvPr>
+        </p:nvSpPr>
+        <p:spPr/>
+        <p:txBody>
+          <a:bodyPr/>
+          <a:lstStyle/>
+          <a:p>
+            <a:r>
+              <a:rPr lang="fr-BE" smtClean="0"/>
+              <a:t>Big Data 2015</a:t>
+            </a:r>
+            <a:endParaRPr lang="fr-BE"/>
+          </a:p>
+        </p:txBody>
+      </p:sp>
+      <p:sp>
+        <p:nvSpPr>
+          <p:cNvPr id="4" name="Espace réservé du numéro de diapositive 3"/>
+          <p:cNvSpPr>
+            <a:spLocks noGrp="1"/>
+          </p:cNvSpPr>
+          <p:nvPr>
+            <p:ph type="sldNum" sz="quarter" idx="12"/>
+          </p:nvPr>
+        </p:nvSpPr>
+        <p:spPr/>
+        <p:txBody>
+          <a:bodyPr/>
+          <a:lstStyle/>
+          <a:p>
+            <a:fld id="{CF4668DC-857F-487D-BFFA-8C0CA5037977}" type="slidenum">
+              <a:rPr lang="fr-BE" smtClean="0"/>
+              <a:t>2</a:t>
+            </a:fld>
+            <a:endParaRPr lang="fr-BE"/>
+          </a:p>
+        </p:txBody>
+      </p:sp>
     </p:spTree>
     <p:extLst>
       <p:ext uri="{BB962C8B-B14F-4D97-AF65-F5344CB8AC3E}">
@@ -4400,96 +5793,163 @@
             <p:ph type="title"/>
           </p:nvPr>
         </p:nvSpPr>
-        <p:spPr>
-          <a:xfrm>
-            <a:off x="762000" y="5085184"/>
-            <a:ext cx="6781800" cy="1087016"/>
-          </a:xfrm>
-        </p:spPr>
-        <p:txBody>
-          <a:bodyPr/>
-          <a:lstStyle/>
+        <p:spPr/>
+        <p:txBody>
+          <a:bodyPr/>
+          <a:lstStyle/>
+          <a:p>
+            <a:r>
+              <a:rPr lang="en-US" dirty="0" smtClean="0"/>
+              <a:t>Plan</a:t>
+            </a:r>
+            <a:endParaRPr lang="en-US" dirty="0"/>
+          </a:p>
+        </p:txBody>
+      </p:sp>
+      <p:sp>
+        <p:nvSpPr>
+          <p:cNvPr id="3" name="Espace réservé du contenu 2"/>
+          <p:cNvSpPr>
+            <a:spLocks noGrp="1"/>
+          </p:cNvSpPr>
+          <p:nvPr>
+            <p:ph idx="1"/>
+          </p:nvPr>
+        </p:nvSpPr>
+        <p:spPr/>
+        <p:txBody>
+          <a:bodyPr/>
+          <a:lstStyle/>
+          <a:p>
+            <a:endParaRPr lang="en-US" dirty="0"/>
+          </a:p>
+          <a:p>
+            <a:r>
+              <a:rPr lang="en-US" dirty="0"/>
+              <a:t>What is a temporal profile?</a:t>
+            </a:r>
+          </a:p>
           <a:p>
             <a:r>
               <a:rPr lang="en-US" dirty="0" smtClean="0"/>
               <a:t>Motivation</a:t>
             </a:r>
+          </a:p>
+          <a:p>
+            <a:r>
+              <a:rPr lang="en-US" dirty="0" smtClean="0"/>
+              <a:t>Corpus</a:t>
+            </a:r>
+          </a:p>
+          <a:p>
+            <a:r>
+              <a:rPr lang="en-US" dirty="0" smtClean="0"/>
+              <a:t>How </a:t>
+            </a:r>
+            <a:r>
+              <a:rPr lang="en-US" dirty="0" err="1" smtClean="0"/>
+              <a:t>smargn</a:t>
+            </a:r>
+            <a:r>
+              <a:rPr lang="en-US" dirty="0" smtClean="0"/>
+              <a:t> works</a:t>
+            </a:r>
+          </a:p>
+          <a:p>
+            <a:r>
+              <a:rPr lang="en-US" dirty="0" smtClean="0"/>
+              <a:t>Example I : “</a:t>
+            </a:r>
+            <a:r>
+              <a:rPr lang="en-US" dirty="0" err="1" smtClean="0"/>
+              <a:t>neige</a:t>
+            </a:r>
+            <a:r>
+              <a:rPr lang="en-US" dirty="0" smtClean="0"/>
+              <a:t>”</a:t>
+            </a:r>
+          </a:p>
+          <a:p>
+            <a:r>
+              <a:rPr lang="en-US" dirty="0" smtClean="0"/>
+              <a:t>Example II : “</a:t>
+            </a:r>
+            <a:r>
+              <a:rPr lang="en-US" dirty="0" err="1" smtClean="0"/>
+              <a:t>conflits</a:t>
+            </a:r>
+            <a:r>
+              <a:rPr lang="en-US" dirty="0" smtClean="0"/>
+              <a:t>”</a:t>
+            </a:r>
+          </a:p>
+          <a:p>
+            <a:r>
+              <a:rPr lang="en-US" dirty="0" smtClean="0"/>
+              <a:t>Conclusion</a:t>
+            </a:r>
+          </a:p>
+          <a:p>
             <a:endParaRPr lang="en-US" dirty="0"/>
           </a:p>
         </p:txBody>
       </p:sp>
       <p:sp>
         <p:nvSpPr>
-          <p:cNvPr id="3" name="Espace réservé du contenu 2"/>
-          <p:cNvSpPr>
-            <a:spLocks noGrp="1"/>
-          </p:cNvSpPr>
-          <p:nvPr>
-            <p:ph idx="1"/>
-          </p:nvPr>
-        </p:nvSpPr>
-        <p:spPr/>
-        <p:txBody>
-          <a:bodyPr/>
-          <a:lstStyle/>
-          <a:p>
-            <a:r>
-              <a:rPr lang="en-US" dirty="0" smtClean="0"/>
-              <a:t>Studies based on n-grams have become popular</a:t>
-            </a:r>
-          </a:p>
-          <a:p>
-            <a:r>
-              <a:rPr lang="en-US" dirty="0" smtClean="0"/>
-              <a:t>Most of them relied on researcher’s intuition</a:t>
-            </a:r>
-          </a:p>
-          <a:p>
-            <a:r>
-              <a:rPr lang="en-US" dirty="0" smtClean="0"/>
-              <a:t>We provide a way to reverse the process</a:t>
-            </a:r>
-          </a:p>
-          <a:p>
-            <a:pPr lvl="1"/>
-            <a:r>
-              <a:rPr lang="en-US" dirty="0" smtClean="0"/>
-              <a:t>Look for interesting words</a:t>
-            </a:r>
-          </a:p>
-          <a:p>
-            <a:pPr lvl="1"/>
-            <a:r>
-              <a:rPr lang="en-US" dirty="0" smtClean="0"/>
-              <a:t>Find similar temporal profiles</a:t>
-            </a:r>
-          </a:p>
-          <a:p>
-            <a:pPr lvl="1"/>
-            <a:r>
-              <a:rPr lang="en-US" dirty="0" smtClean="0"/>
-              <a:t>Understand why</a:t>
-            </a:r>
+          <p:cNvPr id="4" name="Espace réservé du pied de page 3"/>
+          <p:cNvSpPr>
+            <a:spLocks noGrp="1"/>
+          </p:cNvSpPr>
+          <p:nvPr>
+            <p:ph type="ftr" sz="quarter" idx="11"/>
+          </p:nvPr>
+        </p:nvSpPr>
+        <p:spPr/>
+        <p:txBody>
+          <a:bodyPr/>
+          <a:lstStyle/>
+          <a:p>
+            <a:r>
+              <a:rPr lang="fr-BE" smtClean="0"/>
+              <a:t>Big Data 2015</a:t>
+            </a:r>
+            <a:endParaRPr lang="fr-BE"/>
+          </a:p>
+        </p:txBody>
+      </p:sp>
+      <p:sp>
+        <p:nvSpPr>
+          <p:cNvPr id="5" name="Espace réservé du numéro de diapositive 4"/>
+          <p:cNvSpPr>
+            <a:spLocks noGrp="1"/>
+          </p:cNvSpPr>
+          <p:nvPr>
+            <p:ph type="sldNum" sz="quarter" idx="12"/>
+          </p:nvPr>
+        </p:nvSpPr>
+        <p:spPr/>
+        <p:txBody>
+          <a:bodyPr/>
+          <a:lstStyle/>
+          <a:p>
+            <a:fld id="{CF4668DC-857F-487D-BFFA-8C0CA5037977}" type="slidenum">
+              <a:rPr lang="fr-BE" smtClean="0"/>
+              <a:t>3</a:t>
+            </a:fld>
+            <a:endParaRPr lang="fr-BE"/>
           </a:p>
         </p:txBody>
       </p:sp>
     </p:spTree>
     <p:extLst>
       <p:ext uri="{BB962C8B-B14F-4D97-AF65-F5344CB8AC3E}">
-        <p14:creationId xmlns:p14="http://schemas.microsoft.com/office/powerpoint/2010/main" val="2364578536"/>
+        <p14:creationId xmlns:p14="http://schemas.microsoft.com/office/powerpoint/2010/main" val="3330443909"/>
       </p:ext>
     </p:extLst>
   </p:cSld>
   <p:clrMapOvr>
     <a:masterClrMapping/>
   </p:clrMapOvr>
-  <p:timing>
-    <p:tnLst>
-      <p:par>
-        <p:cTn id="1" dur="indefinite" restart="never" nodeType="tmRoot"/>
-      </p:par>
-    </p:tnLst>
-  </p:timing>
 </p:sld>
 </file>
 
@@ -4522,67 +5982,119 @@
         </p:nvSpPr>
         <p:spPr/>
         <p:txBody>
-          <a:bodyPr/>
+          <a:bodyPr>
+            <a:normAutofit/>
+          </a:bodyPr>
           <a:lstStyle/>
           <a:p>
             <a:r>
               <a:rPr lang="en-US" dirty="0" smtClean="0"/>
-              <a:t>Corpus</a:t>
+              <a:t>Understand a </a:t>
+            </a:r>
+            <a:r>
+              <a:rPr lang="en-US" dirty="0" smtClean="0"/>
+              <a:t>profile</a:t>
             </a:r>
             <a:endParaRPr lang="en-US" dirty="0"/>
           </a:p>
         </p:txBody>
       </p:sp>
-      <p:sp>
-        <p:nvSpPr>
-          <p:cNvPr id="3" name="Espace réservé du contenu 2"/>
-          <p:cNvSpPr>
-            <a:spLocks noGrp="1"/>
-          </p:cNvSpPr>
+      <p:pic>
+        <p:nvPicPr>
+          <p:cNvPr id="4" name="Espace réservé du contenu 3"/>
+          <p:cNvPicPr>
+            <a:picLocks noGrp="1" noChangeAspect="1"/>
+          </p:cNvPicPr>
           <p:nvPr>
             <p:ph idx="1"/>
           </p:nvPr>
-        </p:nvSpPr>
-        <p:spPr/>
-        <p:txBody>
-          <a:bodyPr/>
-          <a:lstStyle/>
-          <a:p>
-            <a:r>
-              <a:rPr lang="en-US" dirty="0" smtClean="0"/>
-              <a:t>Le Temps newspaper</a:t>
-            </a:r>
-          </a:p>
-          <a:p>
-            <a:pPr lvl="1"/>
-            <a:r>
-              <a:rPr lang="en-US" dirty="0" smtClean="0"/>
-              <a:t>La Gazette de Lausanne</a:t>
-            </a:r>
-          </a:p>
-          <a:p>
-            <a:pPr lvl="1"/>
-            <a:r>
-              <a:rPr lang="en-US" dirty="0" smtClean="0"/>
-              <a:t>Le Journal de Genève</a:t>
-            </a:r>
-          </a:p>
-          <a:p>
-            <a:endParaRPr lang="en-US" dirty="0"/>
-          </a:p>
-          <a:p>
-            <a:r>
-              <a:rPr lang="en-US" dirty="0" smtClean="0"/>
-              <a:t>From 1840 to 1998</a:t>
-            </a:r>
-            <a:endParaRPr lang="en-US" dirty="0"/>
+        </p:nvPicPr>
+        <p:blipFill>
+          <a:blip r:embed="rId2">
+            <a:extLst>
+              <a:ext uri="{28A0092B-C50C-407E-A947-70E740481C1C}">
+                <a14:useLocalDpi xmlns:a14="http://schemas.microsoft.com/office/drawing/2010/main" val="0"/>
+              </a:ext>
+            </a:extLst>
+          </a:blip>
+          <a:stretch>
+            <a:fillRect/>
+          </a:stretch>
+        </p:blipFill>
+        <p:spPr>
+          <a:xfrm>
+            <a:off x="562066" y="476672"/>
+            <a:ext cx="7940886" cy="4775110"/>
+          </a:xfrm>
+          <a:prstGeom prst="rect">
+            <a:avLst/>
+          </a:prstGeom>
+          <a:ln w="38100" cap="sq">
+            <a:solidFill>
+              <a:srgbClr val="000000"/>
+            </a:solidFill>
+            <a:prstDash val="solid"/>
+            <a:miter lim="800000"/>
+          </a:ln>
+          <a:effectLst>
+            <a:outerShdw blurRad="50800" dist="38100" dir="2700000" algn="tl" rotWithShape="0">
+              <a:srgbClr val="000000">
+                <a:alpha val="43000"/>
+              </a:srgbClr>
+            </a:outerShdw>
+          </a:effectLst>
+        </p:spPr>
+      </p:pic>
+      <p:sp>
+        <p:nvSpPr>
+          <p:cNvPr id="5" name="Espace réservé du pied de page 4"/>
+          <p:cNvSpPr>
+            <a:spLocks noGrp="1"/>
+          </p:cNvSpPr>
+          <p:nvPr>
+            <p:ph type="ftr" sz="quarter" idx="11"/>
+          </p:nvPr>
+        </p:nvSpPr>
+        <p:spPr/>
+        <p:txBody>
+          <a:bodyPr/>
+          <a:lstStyle/>
+          <a:p>
+            <a:r>
+              <a:rPr lang="fr-BE" smtClean="0"/>
+              <a:t>Big Data 2015</a:t>
+            </a:r>
+            <a:endParaRPr lang="fr-BE"/>
+          </a:p>
+        </p:txBody>
+      </p:sp>
+      <p:sp>
+        <p:nvSpPr>
+          <p:cNvPr id="6" name="Espace réservé du numéro de diapositive 5"/>
+          <p:cNvSpPr>
+            <a:spLocks noGrp="1"/>
+          </p:cNvSpPr>
+          <p:nvPr>
+            <p:ph type="sldNum" sz="quarter" idx="12"/>
+          </p:nvPr>
+        </p:nvSpPr>
+        <p:spPr/>
+        <p:txBody>
+          <a:bodyPr/>
+          <a:lstStyle/>
+          <a:p>
+            <a:fld id="{CF4668DC-857F-487D-BFFA-8C0CA5037977}" type="slidenum">
+              <a:rPr lang="fr-BE" smtClean="0"/>
+              <a:t>4</a:t>
+            </a:fld>
+            <a:endParaRPr lang="fr-BE"/>
           </a:p>
         </p:txBody>
       </p:sp>
     </p:spTree>
     <p:extLst>
       <p:ext uri="{BB962C8B-B14F-4D97-AF65-F5344CB8AC3E}">
-        <p14:creationId xmlns:p14="http://schemas.microsoft.com/office/powerpoint/2010/main" val="2246770364"/>
+        <p14:creationId xmlns:p14="http://schemas.microsoft.com/office/powerpoint/2010/main" val="3211848098"/>
       </p:ext>
     </p:extLst>
   </p:cSld>
@@ -4626,14 +6138,19 @@
             <p:ph type="title"/>
           </p:nvPr>
         </p:nvSpPr>
-        <p:spPr/>
+        <p:spPr>
+          <a:xfrm>
+            <a:off x="762000" y="5085184"/>
+            <a:ext cx="6781800" cy="1087016"/>
+          </a:xfrm>
+        </p:spPr>
         <p:txBody>
           <a:bodyPr/>
           <a:lstStyle/>
           <a:p>
             <a:r>
               <a:rPr lang="en-US" dirty="0" smtClean="0"/>
-              <a:t>Understand the profile</a:t>
+              <a:t>Motivation</a:t>
             </a:r>
             <a:endParaRPr lang="en-US" dirty="0"/>
           </a:p>
@@ -4654,33 +6171,123 @@
           <a:bodyPr/>
           <a:lstStyle/>
           <a:p>
-            <a:pPr marL="0" indent="0">
-              <a:buNone/>
+            <a:pPr>
+              <a:lnSpc>
+                <a:spcPct val="150000"/>
+              </a:lnSpc>
             </a:pPr>
             <a:r>
               <a:rPr lang="en-US" dirty="0" smtClean="0"/>
-              <a:t>Screenshot du </a:t>
-            </a:r>
-            <a:r>
-              <a:rPr lang="en-US" dirty="0" err="1" smtClean="0"/>
-              <a:t>ngrams</a:t>
-            </a:r>
-            <a:r>
-              <a:rPr lang="en-US" dirty="0"/>
-              <a:t> </a:t>
-            </a:r>
+              <a:t>Studies based on n-grams have become popular</a:t>
+            </a:r>
+          </a:p>
+          <a:p>
+            <a:pPr>
+              <a:lnSpc>
+                <a:spcPct val="150000"/>
+              </a:lnSpc>
+            </a:pPr>
             <a:r>
               <a:rPr lang="en-US" dirty="0" smtClean="0"/>
-              <a:t>viewer</a:t>
-            </a:r>
-            <a:endParaRPr lang="en-US" dirty="0"/>
+              <a:t>Most of them relied on researcher’s intuition</a:t>
+            </a:r>
+          </a:p>
+          <a:p>
+            <a:pPr>
+              <a:lnSpc>
+                <a:spcPct val="150000"/>
+              </a:lnSpc>
+            </a:pPr>
+            <a:r>
+              <a:rPr lang="en-US" dirty="0" smtClean="0"/>
+              <a:t>We provide a way to reverse the process</a:t>
+            </a:r>
+          </a:p>
+          <a:p>
+            <a:pPr lvl="1">
+              <a:lnSpc>
+                <a:spcPct val="150000"/>
+              </a:lnSpc>
+            </a:pPr>
+            <a:r>
+              <a:rPr lang="en-US" dirty="0" smtClean="0"/>
+              <a:t>Look for interesting words</a:t>
+            </a:r>
+          </a:p>
+          <a:p>
+            <a:pPr lvl="1">
+              <a:lnSpc>
+                <a:spcPct val="150000"/>
+              </a:lnSpc>
+            </a:pPr>
+            <a:r>
+              <a:rPr lang="en-US" dirty="0" smtClean="0"/>
+              <a:t>Find similar temporal profiles</a:t>
+            </a:r>
+          </a:p>
+          <a:p>
+            <a:pPr lvl="1">
+              <a:lnSpc>
+                <a:spcPct val="150000"/>
+              </a:lnSpc>
+            </a:pPr>
+            <a:r>
+              <a:rPr lang="en-US" dirty="0" smtClean="0"/>
+              <a:t>Understand why</a:t>
+            </a:r>
+          </a:p>
+        </p:txBody>
+      </p:sp>
+      <p:sp>
+        <p:nvSpPr>
+          <p:cNvPr id="4" name="Espace réservé du pied de page 3"/>
+          <p:cNvSpPr>
+            <a:spLocks noGrp="1"/>
+          </p:cNvSpPr>
+          <p:nvPr>
+            <p:ph type="ftr" sz="quarter" idx="11"/>
+          </p:nvPr>
+        </p:nvSpPr>
+        <p:spPr/>
+        <p:txBody>
+          <a:bodyPr/>
+          <a:lstStyle/>
+          <a:p>
+            <a:r>
+              <a:rPr lang="fr-BE" smtClean="0"/>
+              <a:t>Big Data 2015</a:t>
+            </a:r>
+            <a:endParaRPr lang="fr-BE"/>
+          </a:p>
+        </p:txBody>
+      </p:sp>
+      <p:sp>
+        <p:nvSpPr>
+          <p:cNvPr id="5" name="Espace réservé du numéro de diapositive 4"/>
+          <p:cNvSpPr>
+            <a:spLocks noGrp="1"/>
+          </p:cNvSpPr>
+          <p:nvPr>
+            <p:ph type="sldNum" sz="quarter" idx="12"/>
+          </p:nvPr>
+        </p:nvSpPr>
+        <p:spPr/>
+        <p:txBody>
+          <a:bodyPr/>
+          <a:lstStyle/>
+          <a:p>
+            <a:fld id="{CF4668DC-857F-487D-BFFA-8C0CA5037977}" type="slidenum">
+              <a:rPr lang="fr-BE" smtClean="0"/>
+              <a:t>5</a:t>
+            </a:fld>
+            <a:endParaRPr lang="fr-BE"/>
           </a:p>
         </p:txBody>
       </p:sp>
     </p:spTree>
     <p:extLst>
       <p:ext uri="{BB962C8B-B14F-4D97-AF65-F5344CB8AC3E}">
-        <p14:creationId xmlns:p14="http://schemas.microsoft.com/office/powerpoint/2010/main" val="3211848098"/>
+        <p14:creationId xmlns:p14="http://schemas.microsoft.com/office/powerpoint/2010/main" val="2364578536"/>
       </p:ext>
     </p:extLst>
   </p:cSld>
@@ -4726,18 +6333,193 @@
         </p:nvSpPr>
         <p:spPr/>
         <p:txBody>
+          <a:bodyPr/>
+          <a:lstStyle/>
+          <a:p>
+            <a:r>
+              <a:rPr lang="en-US" dirty="0" smtClean="0"/>
+              <a:t>Corpus</a:t>
+            </a:r>
+            <a:endParaRPr lang="en-US" dirty="0"/>
+          </a:p>
+        </p:txBody>
+      </p:sp>
+      <p:sp>
+        <p:nvSpPr>
+          <p:cNvPr id="3" name="Espace réservé du contenu 2"/>
+          <p:cNvSpPr>
+            <a:spLocks noGrp="1"/>
+          </p:cNvSpPr>
+          <p:nvPr>
+            <p:ph idx="1"/>
+          </p:nvPr>
+        </p:nvSpPr>
+        <p:spPr/>
+        <p:txBody>
+          <a:bodyPr/>
+          <a:lstStyle/>
+          <a:p>
+            <a:r>
+              <a:rPr lang="en-US" dirty="0" smtClean="0"/>
+              <a:t>Le Temps newspaper</a:t>
+            </a:r>
+          </a:p>
+          <a:p>
+            <a:pPr lvl="1"/>
+            <a:r>
+              <a:rPr lang="en-US" dirty="0" smtClean="0"/>
+              <a:t>La Gazette de Lausanne</a:t>
+            </a:r>
+          </a:p>
+          <a:p>
+            <a:pPr lvl="1"/>
+            <a:r>
+              <a:rPr lang="en-US" dirty="0" smtClean="0"/>
+              <a:t>Le Journal de Genève</a:t>
+            </a:r>
+          </a:p>
+          <a:p>
+            <a:endParaRPr lang="en-US" dirty="0"/>
+          </a:p>
+          <a:p>
+            <a:r>
+              <a:rPr lang="en-US" dirty="0" smtClean="0"/>
+              <a:t>OCR from </a:t>
+            </a:r>
+            <a:r>
+              <a:rPr lang="en-US" dirty="0" smtClean="0"/>
+              <a:t>1840 to </a:t>
+            </a:r>
+            <a:r>
+              <a:rPr lang="en-US" dirty="0" smtClean="0"/>
+              <a:t>1998</a:t>
+            </a:r>
+          </a:p>
+          <a:p>
+            <a:pPr marL="0" indent="0">
+              <a:buNone/>
+            </a:pPr>
+            <a:r>
+              <a:rPr lang="en-US" dirty="0" smtClean="0">
+                <a:sym typeface="Wingdings" panose="05000000000000000000" pitchFamily="2" charset="2"/>
+              </a:rPr>
+              <a:t> Cleaning of the data required</a:t>
+            </a:r>
+            <a:endParaRPr lang="en-US" dirty="0"/>
+          </a:p>
+        </p:txBody>
+      </p:sp>
+      <p:sp>
+        <p:nvSpPr>
+          <p:cNvPr id="4" name="Espace réservé du pied de page 3"/>
+          <p:cNvSpPr>
+            <a:spLocks noGrp="1"/>
+          </p:cNvSpPr>
+          <p:nvPr>
+            <p:ph type="ftr" sz="quarter" idx="11"/>
+          </p:nvPr>
+        </p:nvSpPr>
+        <p:spPr/>
+        <p:txBody>
+          <a:bodyPr/>
+          <a:lstStyle/>
+          <a:p>
+            <a:r>
+              <a:rPr lang="fr-BE" smtClean="0"/>
+              <a:t>Big Data 2015</a:t>
+            </a:r>
+            <a:endParaRPr lang="fr-BE"/>
+          </a:p>
+        </p:txBody>
+      </p:sp>
+      <p:sp>
+        <p:nvSpPr>
+          <p:cNvPr id="5" name="Espace réservé du numéro de diapositive 4"/>
+          <p:cNvSpPr>
+            <a:spLocks noGrp="1"/>
+          </p:cNvSpPr>
+          <p:nvPr>
+            <p:ph type="sldNum" sz="quarter" idx="12"/>
+          </p:nvPr>
+        </p:nvSpPr>
+        <p:spPr/>
+        <p:txBody>
+          <a:bodyPr/>
+          <a:lstStyle/>
+          <a:p>
+            <a:fld id="{CF4668DC-857F-487D-BFFA-8C0CA5037977}" type="slidenum">
+              <a:rPr lang="fr-BE" smtClean="0"/>
+              <a:t>6</a:t>
+            </a:fld>
+            <a:endParaRPr lang="fr-BE"/>
+          </a:p>
+        </p:txBody>
+      </p:sp>
+    </p:spTree>
+    <p:extLst>
+      <p:ext uri="{BB962C8B-B14F-4D97-AF65-F5344CB8AC3E}">
+        <p14:creationId xmlns:p14="http://schemas.microsoft.com/office/powerpoint/2010/main" val="2246770364"/>
+      </p:ext>
+    </p:extLst>
+  </p:cSld>
+  <p:clrMapOvr>
+    <a:masterClrMapping/>
+  </p:clrMapOvr>
+  <p:timing>
+    <p:tnLst>
+      <p:par>
+        <p:cTn id="1" dur="indefinite" restart="never" nodeType="tmRoot"/>
+      </p:par>
+    </p:tnLst>
+  </p:timing>
+</p:sld>
+</file>
+
+<file path=ppt/slides/slide7.xml><?xml version="1.0" encoding="utf-8"?>
+<p:sld xmlns:a="http://schemas.openxmlformats.org/drawingml/2006/main" xmlns:r="http://schemas.openxmlformats.org/officeDocument/2006/relationships" xmlns:p="http://schemas.openxmlformats.org/presentationml/2006/main">
+  <p:cSld>
+    <p:spTree>
+      <p:nvGrpSpPr>
+        <p:cNvPr id="1" name=""/>
+        <p:cNvGrpSpPr/>
+        <p:nvPr/>
+      </p:nvGrpSpPr>
+      <p:grpSpPr>
+        <a:xfrm>
+          <a:off x="0" y="0"/>
+          <a:ext cx="0" cy="0"/>
+          <a:chOff x="0" y="0"/>
+          <a:chExt cx="0" cy="0"/>
+        </a:xfrm>
+      </p:grpSpPr>
+      <p:sp>
+        <p:nvSpPr>
+          <p:cNvPr id="2" name="Titre 1"/>
+          <p:cNvSpPr>
+            <a:spLocks noGrp="1"/>
+          </p:cNvSpPr>
+          <p:nvPr>
+            <p:ph type="title"/>
+          </p:nvPr>
+        </p:nvSpPr>
+        <p:spPr/>
+        <p:txBody>
           <a:bodyPr>
             <a:normAutofit/>
           </a:bodyPr>
           <a:lstStyle/>
           <a:p>
             <a:r>
-              <a:rPr lang="en-US" smtClean="0"/>
-              <a:t>Example</a:t>
-            </a:r>
-            <a:r>
               <a:rPr lang="en-US" dirty="0" smtClean="0"/>
-              <a:t>: “guerre”</a:t>
+              <a:t>How </a:t>
+            </a:r>
+            <a:r>
+              <a:rPr lang="en-US" dirty="0" err="1" smtClean="0"/>
+              <a:t>smargn</a:t>
+            </a:r>
+            <a:r>
+              <a:rPr lang="en-US" dirty="0" smtClean="0"/>
+              <a:t> works</a:t>
             </a:r>
             <a:endParaRPr lang="en-US" dirty="0"/>
           </a:p>
@@ -4758,7 +6540,237 @@
           <a:bodyPr/>
           <a:lstStyle/>
           <a:p>
-            <a:endParaRPr lang="en-US"/>
+            <a:r>
+              <a:rPr lang="en-US" dirty="0" smtClean="0"/>
+              <a:t>Different comparison techniques implemented</a:t>
+            </a:r>
+          </a:p>
+          <a:p>
+            <a:pPr lvl="1"/>
+            <a:r>
+              <a:rPr lang="en-US" dirty="0" smtClean="0"/>
+              <a:t>Naïve comparison</a:t>
+            </a:r>
+          </a:p>
+          <a:p>
+            <a:pPr lvl="1"/>
+            <a:r>
+              <a:rPr lang="en-US" dirty="0" smtClean="0"/>
+              <a:t>Peak detection</a:t>
+            </a:r>
+          </a:p>
+          <a:p>
+            <a:pPr lvl="1"/>
+            <a:r>
+              <a:rPr lang="en-US" dirty="0" smtClean="0"/>
+              <a:t>Dynamic Time Wrapping</a:t>
+            </a:r>
+          </a:p>
+          <a:p>
+            <a:pPr lvl="1"/>
+            <a:r>
+              <a:rPr lang="en-US" dirty="0" smtClean="0"/>
+              <a:t>…</a:t>
+            </a:r>
+          </a:p>
+          <a:p>
+            <a:r>
+              <a:rPr lang="en-US" dirty="0" smtClean="0"/>
+              <a:t>Check a word’s profile against all the other</a:t>
+            </a:r>
+          </a:p>
+        </p:txBody>
+      </p:sp>
+      <p:sp>
+        <p:nvSpPr>
+          <p:cNvPr id="4" name="Espace réservé du pied de page 3"/>
+          <p:cNvSpPr>
+            <a:spLocks noGrp="1"/>
+          </p:cNvSpPr>
+          <p:nvPr>
+            <p:ph type="ftr" sz="quarter" idx="11"/>
+          </p:nvPr>
+        </p:nvSpPr>
+        <p:spPr/>
+        <p:txBody>
+          <a:bodyPr/>
+          <a:lstStyle/>
+          <a:p>
+            <a:r>
+              <a:rPr lang="fr-BE" smtClean="0"/>
+              <a:t>Big Data 2015</a:t>
+            </a:r>
+            <a:endParaRPr lang="fr-BE"/>
+          </a:p>
+        </p:txBody>
+      </p:sp>
+      <p:sp>
+        <p:nvSpPr>
+          <p:cNvPr id="5" name="Espace réservé du numéro de diapositive 4"/>
+          <p:cNvSpPr>
+            <a:spLocks noGrp="1"/>
+          </p:cNvSpPr>
+          <p:nvPr>
+            <p:ph type="sldNum" sz="quarter" idx="12"/>
+          </p:nvPr>
+        </p:nvSpPr>
+        <p:spPr/>
+        <p:txBody>
+          <a:bodyPr/>
+          <a:lstStyle/>
+          <a:p>
+            <a:fld id="{CF4668DC-857F-487D-BFFA-8C0CA5037977}" type="slidenum">
+              <a:rPr lang="fr-BE" smtClean="0"/>
+              <a:t>7</a:t>
+            </a:fld>
+            <a:endParaRPr lang="fr-BE"/>
+          </a:p>
+        </p:txBody>
+      </p:sp>
+    </p:spTree>
+    <p:extLst>
+      <p:ext uri="{BB962C8B-B14F-4D97-AF65-F5344CB8AC3E}">
+        <p14:creationId xmlns:p14="http://schemas.microsoft.com/office/powerpoint/2010/main" val="532466441"/>
+      </p:ext>
+    </p:extLst>
+  </p:cSld>
+  <p:clrMapOvr>
+    <a:masterClrMapping/>
+  </p:clrMapOvr>
+</p:sld>
+</file>
+
+<file path=ppt/slides/slide8.xml><?xml version="1.0" encoding="utf-8"?>
+<p:sld xmlns:a="http://schemas.openxmlformats.org/drawingml/2006/main" xmlns:r="http://schemas.openxmlformats.org/officeDocument/2006/relationships" xmlns:p="http://schemas.openxmlformats.org/presentationml/2006/main">
+  <p:cSld>
+    <p:spTree>
+      <p:nvGrpSpPr>
+        <p:cNvPr id="1" name=""/>
+        <p:cNvGrpSpPr/>
+        <p:nvPr/>
+      </p:nvGrpSpPr>
+      <p:grpSpPr>
+        <a:xfrm>
+          <a:off x="0" y="0"/>
+          <a:ext cx="0" cy="0"/>
+          <a:chOff x="0" y="0"/>
+          <a:chExt cx="0" cy="0"/>
+        </a:xfrm>
+      </p:grpSpPr>
+      <p:sp>
+        <p:nvSpPr>
+          <p:cNvPr id="2" name="Titre 1"/>
+          <p:cNvSpPr>
+            <a:spLocks noGrp="1"/>
+          </p:cNvSpPr>
+          <p:nvPr>
+            <p:ph type="title"/>
+          </p:nvPr>
+        </p:nvSpPr>
+        <p:spPr/>
+        <p:txBody>
+          <a:bodyPr>
+            <a:normAutofit/>
+          </a:bodyPr>
+          <a:lstStyle/>
+          <a:p>
+            <a:r>
+              <a:rPr lang="en-US" dirty="0" err="1" smtClean="0"/>
+              <a:t>neige</a:t>
+            </a:r>
+            <a:endParaRPr lang="en-US" dirty="0"/>
+          </a:p>
+        </p:txBody>
+      </p:sp>
+      <p:pic>
+        <p:nvPicPr>
+          <p:cNvPr id="4" name="Espace réservé du contenu 3"/>
+          <p:cNvPicPr>
+            <a:picLocks noGrp="1" noChangeAspect="1"/>
+          </p:cNvPicPr>
+          <p:nvPr>
+            <p:ph idx="1"/>
+          </p:nvPr>
+        </p:nvPicPr>
+        <p:blipFill>
+          <a:blip r:embed="rId2">
+            <a:extLst>
+              <a:ext uri="{28A0092B-C50C-407E-A947-70E740481C1C}">
+                <a14:useLocalDpi xmlns:a14="http://schemas.microsoft.com/office/drawing/2010/main" val="0"/>
+              </a:ext>
+            </a:extLst>
+          </a:blip>
+          <a:stretch>
+            <a:fillRect/>
+          </a:stretch>
+        </p:blipFill>
+        <p:spPr>
+          <a:xfrm>
+            <a:off x="467544" y="476672"/>
+            <a:ext cx="8280920" cy="4853195"/>
+          </a:xfrm>
+          <a:prstGeom prst="rect">
+            <a:avLst/>
+          </a:prstGeom>
+          <a:ln w="38100" cap="sq">
+            <a:solidFill>
+              <a:srgbClr val="000000"/>
+            </a:solidFill>
+            <a:prstDash val="solid"/>
+            <a:miter lim="800000"/>
+          </a:ln>
+          <a:effectLst>
+            <a:outerShdw blurRad="50800" dist="38100" dir="2700000" algn="tl" rotWithShape="0">
+              <a:srgbClr val="000000">
+                <a:alpha val="43000"/>
+              </a:srgbClr>
+            </a:outerShdw>
+          </a:effectLst>
+        </p:spPr>
+      </p:pic>
+      <p:sp>
+        <p:nvSpPr>
+          <p:cNvPr id="5" name="Espace réservé du pied de page 4"/>
+          <p:cNvSpPr>
+            <a:spLocks noGrp="1"/>
+          </p:cNvSpPr>
+          <p:nvPr>
+            <p:ph type="ftr" sz="quarter" idx="11"/>
+          </p:nvPr>
+        </p:nvSpPr>
+        <p:spPr/>
+        <p:txBody>
+          <a:bodyPr/>
+          <a:lstStyle/>
+          <a:p>
+            <a:r>
+              <a:rPr lang="fr-BE" smtClean="0"/>
+              <a:t>Big Data 2015</a:t>
+            </a:r>
+            <a:endParaRPr lang="fr-BE"/>
+          </a:p>
+        </p:txBody>
+      </p:sp>
+      <p:sp>
+        <p:nvSpPr>
+          <p:cNvPr id="6" name="Espace réservé du numéro de diapositive 5"/>
+          <p:cNvSpPr>
+            <a:spLocks noGrp="1"/>
+          </p:cNvSpPr>
+          <p:nvPr>
+            <p:ph type="sldNum" sz="quarter" idx="12"/>
+          </p:nvPr>
+        </p:nvSpPr>
+        <p:spPr/>
+        <p:txBody>
+          <a:bodyPr/>
+          <a:lstStyle/>
+          <a:p>
+            <a:fld id="{CF4668DC-857F-487D-BFFA-8C0CA5037977}" type="slidenum">
+              <a:rPr lang="fr-BE" smtClean="0"/>
+              <a:t>8</a:t>
+            </a:fld>
+            <a:endParaRPr lang="fr-BE"/>
           </a:p>
         </p:txBody>
       </p:sp>
@@ -4766,6 +6778,181 @@
     <p:extLst>
       <p:ext uri="{BB962C8B-B14F-4D97-AF65-F5344CB8AC3E}">
         <p14:creationId xmlns:p14="http://schemas.microsoft.com/office/powerpoint/2010/main" val="890332769"/>
+      </p:ext>
+    </p:extLst>
+  </p:cSld>
+  <p:clrMapOvr>
+    <a:masterClrMapping/>
+  </p:clrMapOvr>
+  <p:timing>
+    <p:tnLst>
+      <p:par>
+        <p:cTn id="1" dur="indefinite" restart="never" nodeType="tmRoot"/>
+      </p:par>
+    </p:tnLst>
+  </p:timing>
+</p:sld>
+</file>
+
+<file path=ppt/slides/slide9.xml><?xml version="1.0" encoding="utf-8"?>
+<p:sld xmlns:a="http://schemas.openxmlformats.org/drawingml/2006/main" xmlns:r="http://schemas.openxmlformats.org/officeDocument/2006/relationships" xmlns:p="http://schemas.openxmlformats.org/presentationml/2006/main">
+  <p:cSld>
+    <p:spTree>
+      <p:nvGrpSpPr>
+        <p:cNvPr id="1" name=""/>
+        <p:cNvGrpSpPr/>
+        <p:nvPr/>
+      </p:nvGrpSpPr>
+      <p:grpSpPr>
+        <a:xfrm>
+          <a:off x="0" y="0"/>
+          <a:ext cx="0" cy="0"/>
+          <a:chOff x="0" y="0"/>
+          <a:chExt cx="0" cy="0"/>
+        </a:xfrm>
+      </p:grpSpPr>
+      <p:sp>
+        <p:nvSpPr>
+          <p:cNvPr id="2" name="Titre 1"/>
+          <p:cNvSpPr>
+            <a:spLocks noGrp="1"/>
+          </p:cNvSpPr>
+          <p:nvPr>
+            <p:ph type="title"/>
+          </p:nvPr>
+        </p:nvSpPr>
+        <p:spPr>
+          <a:xfrm>
+            <a:off x="762000" y="4572000"/>
+            <a:ext cx="7338392" cy="1600200"/>
+          </a:xfrm>
+        </p:spPr>
+        <p:txBody>
+          <a:bodyPr>
+            <a:normAutofit/>
+          </a:bodyPr>
+          <a:lstStyle/>
+          <a:p>
+            <a:r>
+              <a:rPr lang="en-US" dirty="0" err="1" smtClean="0"/>
+              <a:t>neige</a:t>
+            </a:r>
+            <a:r>
+              <a:rPr lang="en-US" dirty="0" smtClean="0"/>
+              <a:t>, accident &amp; </a:t>
+            </a:r>
+            <a:r>
+              <a:rPr lang="en-US" dirty="0" err="1" smtClean="0"/>
+              <a:t>victime</a:t>
+            </a:r>
+            <a:endParaRPr lang="en-US" dirty="0"/>
+          </a:p>
+        </p:txBody>
+      </p:sp>
+      <p:pic>
+        <p:nvPicPr>
+          <p:cNvPr id="1027" name="Picture 3" descr="D:\Mes Documents\EPFL\Semestre courant\Big Data\smargn\presentation\neige-accident-victime.png"/>
+          <p:cNvPicPr>
+            <a:picLocks noChangeAspect="1" noChangeArrowheads="1"/>
+          </p:cNvPicPr>
+          <p:nvPr/>
+        </p:nvPicPr>
+        <p:blipFill>
+          <a:blip r:embed="rId2">
+            <a:extLst>
+              <a:ext uri="{28A0092B-C50C-407E-A947-70E740481C1C}">
+                <a14:useLocalDpi xmlns:a14="http://schemas.microsoft.com/office/drawing/2010/main" val="0"/>
+              </a:ext>
+            </a:extLst>
+          </a:blip>
+          <a:srcRect/>
+          <a:stretch>
+            <a:fillRect/>
+          </a:stretch>
+        </p:blipFill>
+        <p:spPr bwMode="auto">
+          <a:xfrm>
+            <a:off x="611560" y="476672"/>
+            <a:ext cx="7969645" cy="4824536"/>
+          </a:xfrm>
+          <a:prstGeom prst="rect">
+            <a:avLst/>
+          </a:prstGeom>
+          <a:ln w="38100" cap="sq">
+            <a:solidFill>
+              <a:srgbClr val="000000"/>
+            </a:solidFill>
+            <a:prstDash val="solid"/>
+            <a:miter lim="800000"/>
+          </a:ln>
+          <a:effectLst>
+            <a:outerShdw blurRad="50800" dist="38100" dir="2700000" algn="tl" rotWithShape="0">
+              <a:srgbClr val="000000">
+                <a:alpha val="43000"/>
+              </a:srgbClr>
+            </a:outerShdw>
+          </a:effectLst>
+          <a:extLst>
+            <a:ext uri="{909E8E84-426E-40DD-AFC4-6F175D3DCCD1}">
+              <a14:hiddenFill xmlns:a14="http://schemas.microsoft.com/office/drawing/2010/main">
+                <a:solidFill>
+                  <a:srgbClr val="FFFFFF"/>
+                </a:solidFill>
+              </a14:hiddenFill>
+            </a:ext>
+          </a:extLst>
+        </p:spPr>
+      </p:pic>
+      <p:sp>
+        <p:nvSpPr>
+          <p:cNvPr id="5" name="Espace réservé du pied de page 4"/>
+          <p:cNvSpPr>
+            <a:spLocks noGrp="1"/>
+          </p:cNvSpPr>
+          <p:nvPr>
+            <p:ph type="ftr" sz="quarter" idx="11"/>
+          </p:nvPr>
+        </p:nvSpPr>
+        <p:spPr/>
+        <p:txBody>
+          <a:bodyPr/>
+          <a:lstStyle/>
+          <a:p>
+            <a:r>
+              <a:rPr lang="fr-BE" smtClean="0"/>
+              <a:t>Big Data 2015</a:t>
+            </a:r>
+            <a:endParaRPr lang="fr-BE"/>
+          </a:p>
+        </p:txBody>
+      </p:sp>
+      <p:sp>
+        <p:nvSpPr>
+          <p:cNvPr id="6" name="Espace réservé du numéro de diapositive 5"/>
+          <p:cNvSpPr>
+            <a:spLocks noGrp="1"/>
+          </p:cNvSpPr>
+          <p:nvPr>
+            <p:ph type="sldNum" sz="quarter" idx="12"/>
+          </p:nvPr>
+        </p:nvSpPr>
+        <p:spPr/>
+        <p:txBody>
+          <a:bodyPr/>
+          <a:lstStyle/>
+          <a:p>
+            <a:fld id="{CF4668DC-857F-487D-BFFA-8C0CA5037977}" type="slidenum">
+              <a:rPr lang="fr-BE" smtClean="0"/>
+              <a:t>9</a:t>
+            </a:fld>
+            <a:endParaRPr lang="fr-BE"/>
+          </a:p>
+        </p:txBody>
+      </p:sp>
+    </p:spTree>
+    <p:extLst>
+      <p:ext uri="{BB962C8B-B14F-4D97-AF65-F5344CB8AC3E}">
+        <p14:creationId xmlns:p14="http://schemas.microsoft.com/office/powerpoint/2010/main" val="2713348260"/>
       </p:ext>
     </p:extLst>
   </p:cSld>
@@ -5055,4 +7242,289 @@
   <a:objectDefaults/>
   <a:extraClrSchemeLst/>
 </a:theme>
+</file>
+
+<file path=ppt/theme/theme2.xml><?xml version="1.0" encoding="utf-8"?>
+<a:theme xmlns:a="http://schemas.openxmlformats.org/drawingml/2006/main" name="Thème Office">
+  <a:themeElements>
+    <a:clrScheme name="Office">
+      <a:dk1>
+        <a:sysClr val="windowText" lastClr="000000"/>
+      </a:dk1>
+      <a:lt1>
+        <a:sysClr val="window" lastClr="FFFFFF"/>
+      </a:lt1>
+      <a:dk2>
+        <a:srgbClr val="1F497D"/>
+      </a:dk2>
+      <a:lt2>
+        <a:srgbClr val="EEECE1"/>
+      </a:lt2>
+      <a:accent1>
+        <a:srgbClr val="4F81BD"/>
+      </a:accent1>
+      <a:accent2>
+        <a:srgbClr val="C0504D"/>
+      </a:accent2>
+      <a:accent3>
+        <a:srgbClr val="9BBB59"/>
+      </a:accent3>
+      <a:accent4>
+        <a:srgbClr val="8064A2"/>
+      </a:accent4>
+      <a:accent5>
+        <a:srgbClr val="4BACC6"/>
+      </a:accent5>
+      <a:accent6>
+        <a:srgbClr val="F79646"/>
+      </a:accent6>
+      <a:hlink>
+        <a:srgbClr val="0000FF"/>
+      </a:hlink>
+      <a:folHlink>
+        <a:srgbClr val="800080"/>
+      </a:folHlink>
+    </a:clrScheme>
+    <a:fontScheme name="Office">
+      <a:majorFont>
+        <a:latin typeface="Calibri"/>
+        <a:ea typeface=""/>
+        <a:cs typeface=""/>
+        <a:font script="Jpan" typeface="ＭＳ Ｐゴシック"/>
+        <a:font script="Hang" typeface="맑은 고딕"/>
+        <a:font script="Hans" typeface="宋体"/>
+        <a:font script="Hant" typeface="新細明體"/>
+        <a:font script="Arab" typeface="Times New Roman"/>
+        <a:font script="Hebr" typeface="Times New Roman"/>
+        <a:font script="Thai" typeface="Angsana New"/>
+        <a:font script="Ethi" typeface="Nyala"/>
+        <a:font script="Beng" typeface="Vrinda"/>
+        <a:font script="Gujr" typeface="Shruti"/>
+        <a:font script="Khmr" typeface="MoolBoran"/>
+        <a:font script="Knda" typeface="Tunga"/>
+        <a:font script="Guru" typeface="Raavi"/>
+        <a:font script="Cans" typeface="Euphemia"/>
+        <a:font script="Cher" typeface="Plantagenet Cherokee"/>
+        <a:font script="Yiii" typeface="Microsoft Yi Baiti"/>
+        <a:font script="Tibt" typeface="Microsoft Himalaya"/>
+        <a:font script="Thaa" typeface="MV Boli"/>
+        <a:font script="Deva" typeface="Mangal"/>
+        <a:font script="Telu" typeface="Gautami"/>
+        <a:font script="Taml" typeface="Latha"/>
+        <a:font script="Syrc" typeface="Estrangelo Edessa"/>
+        <a:font script="Orya" typeface="Kalinga"/>
+        <a:font script="Mlym" typeface="Kartika"/>
+        <a:font script="Laoo" typeface="DokChampa"/>
+        <a:font script="Sinh" typeface="Iskoola Pota"/>
+        <a:font script="Mong" typeface="Mongolian Baiti"/>
+        <a:font script="Viet" typeface="Times New Roman"/>
+        <a:font script="Uigh" typeface="Microsoft Uighur"/>
+        <a:font script="Geor" typeface="Sylfaen"/>
+      </a:majorFont>
+      <a:minorFont>
+        <a:latin typeface="Calibri"/>
+        <a:ea typeface=""/>
+        <a:cs typeface=""/>
+        <a:font script="Jpan" typeface="ＭＳ Ｐゴシック"/>
+        <a:font script="Hang" typeface="맑은 고딕"/>
+        <a:font script="Hans" typeface="宋体"/>
+        <a:font script="Hant" typeface="新細明體"/>
+        <a:font script="Arab" typeface="Arial"/>
+        <a:font script="Hebr" typeface="Arial"/>
+        <a:font script="Thai" typeface="Cordia New"/>
+        <a:font script="Ethi" typeface="Nyala"/>
+        <a:font script="Beng" typeface="Vrinda"/>
+        <a:font script="Gujr" typeface="Shruti"/>
+        <a:font script="Khmr" typeface="DaunPenh"/>
+        <a:font script="Knda" typeface="Tunga"/>
+        <a:font script="Guru" typeface="Raavi"/>
+        <a:font script="Cans" typeface="Euphemia"/>
+        <a:font script="Cher" typeface="Plantagenet Cherokee"/>
+        <a:font script="Yiii" typeface="Microsoft Yi Baiti"/>
+        <a:font script="Tibt" typeface="Microsoft Himalaya"/>
+        <a:font script="Thaa" typeface="MV Boli"/>
+        <a:font script="Deva" typeface="Mangal"/>
+        <a:font script="Telu" typeface="Gautami"/>
+        <a:font script="Taml" typeface="Latha"/>
+        <a:font script="Syrc" typeface="Estrangelo Edessa"/>
+        <a:font script="Orya" typeface="Kalinga"/>
+        <a:font script="Mlym" typeface="Kartika"/>
+        <a:font script="Laoo" typeface="DokChampa"/>
+        <a:font script="Sinh" typeface="Iskoola Pota"/>
+        <a:font script="Mong" typeface="Mongolian Baiti"/>
+        <a:font script="Viet" typeface="Arial"/>
+        <a:font script="Uigh" typeface="Microsoft Uighur"/>
+        <a:font script="Geor" typeface="Sylfaen"/>
+      </a:minorFont>
+    </a:fontScheme>
+    <a:fmtScheme name="Office">
+      <a:fillStyleLst>
+        <a:solidFill>
+          <a:schemeClr val="phClr"/>
+        </a:solidFill>
+        <a:gradFill rotWithShape="1">
+          <a:gsLst>
+            <a:gs pos="0">
+              <a:schemeClr val="phClr">
+                <a:tint val="50000"/>
+                <a:satMod val="300000"/>
+              </a:schemeClr>
+            </a:gs>
+            <a:gs pos="35000">
+              <a:schemeClr val="phClr">
+                <a:tint val="37000"/>
+                <a:satMod val="300000"/>
+              </a:schemeClr>
+            </a:gs>
+            <a:gs pos="100000">
+              <a:schemeClr val="phClr">
+                <a:tint val="15000"/>
+                <a:satMod val="350000"/>
+              </a:schemeClr>
+            </a:gs>
+          </a:gsLst>
+          <a:lin ang="16200000" scaled="1"/>
+        </a:gradFill>
+        <a:gradFill rotWithShape="1">
+          <a:gsLst>
+            <a:gs pos="0">
+              <a:schemeClr val="phClr">
+                <a:shade val="51000"/>
+                <a:satMod val="130000"/>
+              </a:schemeClr>
+            </a:gs>
+            <a:gs pos="80000">
+              <a:schemeClr val="phClr">
+                <a:shade val="93000"/>
+                <a:satMod val="130000"/>
+              </a:schemeClr>
+            </a:gs>
+            <a:gs pos="100000">
+              <a:schemeClr val="phClr">
+                <a:shade val="94000"/>
+                <a:satMod val="135000"/>
+              </a:schemeClr>
+            </a:gs>
+          </a:gsLst>
+          <a:lin ang="16200000" scaled="0"/>
+        </a:gradFill>
+      </a:fillStyleLst>
+      <a:lnStyleLst>
+        <a:ln w="9525" cap="flat" cmpd="sng" algn="ctr">
+          <a:solidFill>
+            <a:schemeClr val="phClr">
+              <a:shade val="95000"/>
+              <a:satMod val="105000"/>
+            </a:schemeClr>
+          </a:solidFill>
+          <a:prstDash val="solid"/>
+        </a:ln>
+        <a:ln w="25400" cap="flat" cmpd="sng" algn="ctr">
+          <a:solidFill>
+            <a:schemeClr val="phClr"/>
+          </a:solidFill>
+          <a:prstDash val="solid"/>
+        </a:ln>
+        <a:ln w="38100" cap="flat" cmpd="sng" algn="ctr">
+          <a:solidFill>
+            <a:schemeClr val="phClr"/>
+          </a:solidFill>
+          <a:prstDash val="solid"/>
+        </a:ln>
+      </a:lnStyleLst>
+      <a:effectStyleLst>
+        <a:effectStyle>
+          <a:effectLst>
+            <a:outerShdw blurRad="40000" dist="20000" dir="5400000" rotWithShape="0">
+              <a:srgbClr val="000000">
+                <a:alpha val="38000"/>
+              </a:srgbClr>
+            </a:outerShdw>
+          </a:effectLst>
+        </a:effectStyle>
+        <a:effectStyle>
+          <a:effectLst>
+            <a:outerShdw blurRad="40000" dist="23000" dir="5400000" rotWithShape="0">
+              <a:srgbClr val="000000">
+                <a:alpha val="35000"/>
+              </a:srgbClr>
+            </a:outerShdw>
+          </a:effectLst>
+        </a:effectStyle>
+        <a:effectStyle>
+          <a:effectLst>
+            <a:outerShdw blurRad="40000" dist="23000" dir="5400000" rotWithShape="0">
+              <a:srgbClr val="000000">
+                <a:alpha val="35000"/>
+              </a:srgbClr>
+            </a:outerShdw>
+          </a:effectLst>
+          <a:scene3d>
+            <a:camera prst="orthographicFront">
+              <a:rot lat="0" lon="0" rev="0"/>
+            </a:camera>
+            <a:lightRig rig="threePt" dir="t">
+              <a:rot lat="0" lon="0" rev="1200000"/>
+            </a:lightRig>
+          </a:scene3d>
+          <a:sp3d>
+            <a:bevelT w="63500" h="25400"/>
+          </a:sp3d>
+        </a:effectStyle>
+      </a:effectStyleLst>
+      <a:bgFillStyleLst>
+        <a:solidFill>
+          <a:schemeClr val="phClr"/>
+        </a:solidFill>
+        <a:gradFill rotWithShape="1">
+          <a:gsLst>
+            <a:gs pos="0">
+              <a:schemeClr val="phClr">
+                <a:tint val="40000"/>
+                <a:satMod val="350000"/>
+              </a:schemeClr>
+            </a:gs>
+            <a:gs pos="40000">
+              <a:schemeClr val="phClr">
+                <a:tint val="45000"/>
+                <a:shade val="99000"/>
+                <a:satMod val="350000"/>
+              </a:schemeClr>
+            </a:gs>
+            <a:gs pos="100000">
+              <a:schemeClr val="phClr">
+                <a:shade val="20000"/>
+                <a:satMod val="255000"/>
+              </a:schemeClr>
+            </a:gs>
+          </a:gsLst>
+          <a:path path="circle">
+            <a:fillToRect l="50000" t="-80000" r="50000" b="180000"/>
+          </a:path>
+        </a:gradFill>
+        <a:gradFill rotWithShape="1">
+          <a:gsLst>
+            <a:gs pos="0">
+              <a:schemeClr val="phClr">
+                <a:tint val="80000"/>
+                <a:satMod val="300000"/>
+              </a:schemeClr>
+            </a:gs>
+            <a:gs pos="100000">
+              <a:schemeClr val="phClr">
+                <a:shade val="30000"/>
+                <a:satMod val="200000"/>
+              </a:schemeClr>
+            </a:gs>
+          </a:gsLst>
+          <a:path path="circle">
+            <a:fillToRect l="50000" t="50000" r="50000" b="50000"/>
+          </a:path>
+        </a:gradFill>
+      </a:bgFillStyleLst>
+    </a:fmtScheme>
+  </a:themeElements>
+  <a:objectDefaults/>
+  <a:extraClrSchemeLst/>
+</a:theme>
 </file>
</xml_diff>